<commit_message>
Presentaion file was corrected
</commit_message>
<xml_diff>
--- a/Alifanov.ITLeadersCourse/Automated framework with C#.pptx
+++ b/Alifanov.ITLeadersCourse/Automated framework with C#.pptx
@@ -17881,7 +17881,15 @@
             </a:r>
             <a:r>
               <a:rPr lang="en-US" dirty="0" smtClean="0"/>
-              <a:t> push – Push all local commits to remote repository</a:t>
+              <a:t> </a:t>
+            </a:r>
+            <a:r>
+              <a:rPr lang="en-US" dirty="0" smtClean="0"/>
+              <a:t>push origin (+)HEAD </a:t>
+            </a:r>
+            <a:r>
+              <a:rPr lang="en-US" dirty="0" smtClean="0"/>
+              <a:t>– Push all local commits to remote repository</a:t>
             </a:r>
           </a:p>
           <a:p>

</xml_diff>

<commit_message>
Added Presentation file and answers on Lesson1 home task
</commit_message>
<xml_diff>
--- a/Alifanov.ITLeadersCourse/Automated framework with C#.pptx
+++ b/Alifanov.ITLeadersCourse/Automated framework with C#.pptx
@@ -5,7 +5,7 @@
     <p:sldMasterId id="2147483648" r:id="rId1"/>
   </p:sldMasterIdLst>
   <p:notesMasterIdLst>
-    <p:notesMasterId r:id="rId17"/>
+    <p:notesMasterId r:id="rId21"/>
   </p:notesMasterIdLst>
   <p:sldIdLst>
     <p:sldId id="256" r:id="rId2"/>
@@ -22,7 +22,11 @@
     <p:sldId id="263" r:id="rId13"/>
     <p:sldId id="281" r:id="rId14"/>
     <p:sldId id="264" r:id="rId15"/>
-    <p:sldId id="294" r:id="rId16"/>
+    <p:sldId id="282" r:id="rId16"/>
+    <p:sldId id="266" r:id="rId17"/>
+    <p:sldId id="269" r:id="rId18"/>
+    <p:sldId id="295" r:id="rId19"/>
+    <p:sldId id="294" r:id="rId20"/>
   </p:sldIdLst>
   <p:sldSz cx="12192000" cy="6858000"/>
   <p:notesSz cx="6858000" cy="9144000"/>
@@ -223,7 +227,7 @@
           <a:p>
             <a:fld id="{04BB28D0-A67A-445A-845D-15D23A1D5A30}" type="datetimeFigureOut">
               <a:rPr lang="en-US" smtClean="0"/>
-              <a:t>9/27/2021</a:t>
+              <a:t>9/30/2021</a:t>
             </a:fld>
             <a:endParaRPr lang="en-US"/>
           </a:p>
@@ -955,6 +959,456 @@
             <a:fld id="{72322572-43F4-4B03-89EA-3E2E4F93C9D1}" type="slidenum">
               <a:rPr lang="en-US" smtClean="0"/>
               <a:t>15</a:t>
+            </a:fld>
+            <a:endParaRPr lang="en-US"/>
+          </a:p>
+        </p:txBody>
+      </p:sp>
+    </p:spTree>
+    <p:extLst>
+      <p:ext uri="{BB962C8B-B14F-4D97-AF65-F5344CB8AC3E}">
+        <p14:creationId xmlns:p14="http://schemas.microsoft.com/office/powerpoint/2010/main" val="677723011"/>
+      </p:ext>
+    </p:extLst>
+  </p:cSld>
+  <p:clrMapOvr>
+    <a:masterClrMapping/>
+  </p:clrMapOvr>
+</p:notes>
+</file>
+
+<file path=ppt/notesSlides/notesSlide14.xml><?xml version="1.0" encoding="utf-8"?>
+<p:notes xmlns:a="http://schemas.openxmlformats.org/drawingml/2006/main" xmlns:r="http://schemas.openxmlformats.org/officeDocument/2006/relationships" xmlns:p="http://schemas.openxmlformats.org/presentationml/2006/main">
+  <p:cSld>
+    <p:spTree>
+      <p:nvGrpSpPr>
+        <p:cNvPr id="1" name=""/>
+        <p:cNvGrpSpPr/>
+        <p:nvPr/>
+      </p:nvGrpSpPr>
+      <p:grpSpPr>
+        <a:xfrm>
+          <a:off x="0" y="0"/>
+          <a:ext cx="0" cy="0"/>
+          <a:chOff x="0" y="0"/>
+          <a:chExt cx="0" cy="0"/>
+        </a:xfrm>
+      </p:grpSpPr>
+      <p:sp>
+        <p:nvSpPr>
+          <p:cNvPr id="2" name="Образ слайда 1"/>
+          <p:cNvSpPr>
+            <a:spLocks noGrp="1" noRot="1" noChangeAspect="1"/>
+          </p:cNvSpPr>
+          <p:nvPr>
+            <p:ph type="sldImg"/>
+          </p:nvPr>
+        </p:nvSpPr>
+        <p:spPr/>
+      </p:sp>
+      <p:sp>
+        <p:nvSpPr>
+          <p:cNvPr id="3" name="Заметки 2"/>
+          <p:cNvSpPr>
+            <a:spLocks noGrp="1"/>
+          </p:cNvSpPr>
+          <p:nvPr>
+            <p:ph type="body" idx="1"/>
+          </p:nvPr>
+        </p:nvSpPr>
+        <p:spPr/>
+        <p:txBody>
+          <a:bodyPr/>
+          <a:lstStyle/>
+          <a:p>
+            <a:r>
+              <a:rPr lang="en-US" dirty="0" smtClean="0"/>
+              <a:t>Lesson</a:t>
+            </a:r>
+            <a:r>
+              <a:rPr lang="en-US" baseline="0" dirty="0" smtClean="0"/>
+              <a:t> 2.</a:t>
+            </a:r>
+          </a:p>
+          <a:p>
+            <a:pPr marL="228600" indent="-228600">
+              <a:buAutoNum type="arabicPeriod"/>
+            </a:pPr>
+            <a:r>
+              <a:rPr lang="en-US" baseline="0" dirty="0" smtClean="0"/>
+              <a:t>Implement Input logic</a:t>
+            </a:r>
+          </a:p>
+          <a:p>
+            <a:pPr marL="228600" indent="-228600">
+              <a:buAutoNum type="arabicPeriod"/>
+            </a:pPr>
+            <a:r>
+              <a:rPr lang="en-US" baseline="0" dirty="0" smtClean="0"/>
+              <a:t>Homework questions and answers</a:t>
+            </a:r>
+          </a:p>
+          <a:p>
+            <a:pPr marL="228600" indent="-228600">
+              <a:buAutoNum type="arabicPeriod"/>
+            </a:pPr>
+            <a:r>
+              <a:rPr lang="en-US" baseline="0" dirty="0" smtClean="0"/>
+              <a:t>!!! Pull remote main branch (explain if we create a branch now then new branch will be without all changes made in preceding lesson)</a:t>
+            </a:r>
+          </a:p>
+          <a:p>
+            <a:pPr marL="228600" indent="-228600">
+              <a:buAutoNum type="arabicPeriod"/>
+            </a:pPr>
+            <a:r>
+              <a:rPr lang="en-US" baseline="0" dirty="0" smtClean="0"/>
+              <a:t>Create new branch</a:t>
+            </a:r>
+          </a:p>
+          <a:p>
+            <a:pPr marL="228600" indent="-228600">
+              <a:buAutoNum type="arabicPeriod"/>
+            </a:pPr>
+            <a:endParaRPr lang="en-US" baseline="0" dirty="0" smtClean="0"/>
+          </a:p>
+          <a:p>
+            <a:pPr marL="228600" indent="-228600">
+              <a:buAutoNum type="arabicPeriod"/>
+            </a:pPr>
+            <a:endParaRPr lang="en-US" dirty="0" smtClean="0"/>
+          </a:p>
+        </p:txBody>
+      </p:sp>
+      <p:sp>
+        <p:nvSpPr>
+          <p:cNvPr id="4" name="Номер слайда 3"/>
+          <p:cNvSpPr>
+            <a:spLocks noGrp="1"/>
+          </p:cNvSpPr>
+          <p:nvPr>
+            <p:ph type="sldNum" sz="quarter" idx="10"/>
+          </p:nvPr>
+        </p:nvSpPr>
+        <p:spPr/>
+        <p:txBody>
+          <a:bodyPr/>
+          <a:lstStyle/>
+          <a:p>
+            <a:fld id="{72322572-43F4-4B03-89EA-3E2E4F93C9D1}" type="slidenum">
+              <a:rPr lang="en-US" smtClean="0"/>
+              <a:t>16</a:t>
+            </a:fld>
+            <a:endParaRPr lang="en-US"/>
+          </a:p>
+        </p:txBody>
+      </p:sp>
+    </p:spTree>
+    <p:extLst>
+      <p:ext uri="{BB962C8B-B14F-4D97-AF65-F5344CB8AC3E}">
+        <p14:creationId xmlns:p14="http://schemas.microsoft.com/office/powerpoint/2010/main" val="831893405"/>
+      </p:ext>
+    </p:extLst>
+  </p:cSld>
+  <p:clrMapOvr>
+    <a:masterClrMapping/>
+  </p:clrMapOvr>
+</p:notes>
+</file>
+
+<file path=ppt/notesSlides/notesSlide15.xml><?xml version="1.0" encoding="utf-8"?>
+<p:notes xmlns:a="http://schemas.openxmlformats.org/drawingml/2006/main" xmlns:r="http://schemas.openxmlformats.org/officeDocument/2006/relationships" xmlns:p="http://schemas.openxmlformats.org/presentationml/2006/main">
+  <p:cSld>
+    <p:spTree>
+      <p:nvGrpSpPr>
+        <p:cNvPr id="1" name=""/>
+        <p:cNvGrpSpPr/>
+        <p:nvPr/>
+      </p:nvGrpSpPr>
+      <p:grpSpPr>
+        <a:xfrm>
+          <a:off x="0" y="0"/>
+          <a:ext cx="0" cy="0"/>
+          <a:chOff x="0" y="0"/>
+          <a:chExt cx="0" cy="0"/>
+        </a:xfrm>
+      </p:grpSpPr>
+      <p:sp>
+        <p:nvSpPr>
+          <p:cNvPr id="2" name="Образ слайда 1"/>
+          <p:cNvSpPr>
+            <a:spLocks noGrp="1" noRot="1" noChangeAspect="1"/>
+          </p:cNvSpPr>
+          <p:nvPr>
+            <p:ph type="sldImg"/>
+          </p:nvPr>
+        </p:nvSpPr>
+        <p:spPr/>
+      </p:sp>
+      <p:sp>
+        <p:nvSpPr>
+          <p:cNvPr id="3" name="Заметки 2"/>
+          <p:cNvSpPr>
+            <a:spLocks noGrp="1"/>
+          </p:cNvSpPr>
+          <p:nvPr>
+            <p:ph type="body" idx="1"/>
+          </p:nvPr>
+        </p:nvSpPr>
+        <p:spPr/>
+        <p:txBody>
+          <a:bodyPr/>
+          <a:lstStyle/>
+          <a:p>
+            <a:pPr marL="228600" indent="-228600">
+              <a:buAutoNum type="arabicPeriod"/>
+            </a:pPr>
+            <a:r>
+              <a:rPr lang="en-US" dirty="0" smtClean="0"/>
+              <a:t>Make</a:t>
+            </a:r>
+            <a:r>
+              <a:rPr lang="en-US" baseline="0" dirty="0" smtClean="0"/>
+              <a:t> a commit</a:t>
+            </a:r>
+          </a:p>
+          <a:p>
+            <a:pPr marL="228600" indent="-228600">
+              <a:buAutoNum type="arabicPeriod"/>
+            </a:pPr>
+            <a:r>
+              <a:rPr lang="en-US" baseline="0" dirty="0" smtClean="0"/>
+              <a:t>Push the commit</a:t>
+            </a:r>
+          </a:p>
+          <a:p>
+            <a:pPr marL="228600" indent="-228600">
+              <a:buAutoNum type="arabicPeriod"/>
+            </a:pPr>
+            <a:r>
+              <a:rPr lang="en-US" baseline="0" dirty="0" smtClean="0"/>
+              <a:t>Make a PR and approve it</a:t>
+            </a:r>
+          </a:p>
+          <a:p>
+            <a:pPr marL="228600" indent="-228600">
+              <a:buAutoNum type="arabicPeriod"/>
+            </a:pPr>
+            <a:r>
+              <a:rPr lang="en-US" baseline="0" dirty="0" smtClean="0"/>
+              <a:t>Give homework</a:t>
+            </a:r>
+          </a:p>
+          <a:p>
+            <a:pPr marL="228600" indent="-228600">
+              <a:buAutoNum type="arabicPeriod"/>
+            </a:pPr>
+            <a:endParaRPr lang="en-US" baseline="0" dirty="0" smtClean="0"/>
+          </a:p>
+          <a:p>
+            <a:pPr marL="0" indent="0">
+              <a:buNone/>
+            </a:pPr>
+            <a:r>
+              <a:rPr lang="en-US" baseline="0" dirty="0" smtClean="0"/>
+              <a:t>End Lesson 2.</a:t>
+            </a:r>
+          </a:p>
+        </p:txBody>
+      </p:sp>
+      <p:sp>
+        <p:nvSpPr>
+          <p:cNvPr id="4" name="Номер слайда 3"/>
+          <p:cNvSpPr>
+            <a:spLocks noGrp="1"/>
+          </p:cNvSpPr>
+          <p:nvPr>
+            <p:ph type="sldNum" sz="quarter" idx="10"/>
+          </p:nvPr>
+        </p:nvSpPr>
+        <p:spPr/>
+        <p:txBody>
+          <a:bodyPr/>
+          <a:lstStyle/>
+          <a:p>
+            <a:fld id="{72322572-43F4-4B03-89EA-3E2E4F93C9D1}" type="slidenum">
+              <a:rPr lang="en-US" smtClean="0"/>
+              <a:t>17</a:t>
+            </a:fld>
+            <a:endParaRPr lang="en-US"/>
+          </a:p>
+        </p:txBody>
+      </p:sp>
+    </p:spTree>
+    <p:extLst>
+      <p:ext uri="{BB962C8B-B14F-4D97-AF65-F5344CB8AC3E}">
+        <p14:creationId xmlns:p14="http://schemas.microsoft.com/office/powerpoint/2010/main" val="959647651"/>
+      </p:ext>
+    </p:extLst>
+  </p:cSld>
+  <p:clrMapOvr>
+    <a:masterClrMapping/>
+  </p:clrMapOvr>
+</p:notes>
+</file>
+
+<file path=ppt/notesSlides/notesSlide16.xml><?xml version="1.0" encoding="utf-8"?>
+<p:notes xmlns:a="http://schemas.openxmlformats.org/drawingml/2006/main" xmlns:r="http://schemas.openxmlformats.org/officeDocument/2006/relationships" xmlns:p="http://schemas.openxmlformats.org/presentationml/2006/main">
+  <p:cSld>
+    <p:spTree>
+      <p:nvGrpSpPr>
+        <p:cNvPr id="1" name=""/>
+        <p:cNvGrpSpPr/>
+        <p:nvPr/>
+      </p:nvGrpSpPr>
+      <p:grpSpPr>
+        <a:xfrm>
+          <a:off x="0" y="0"/>
+          <a:ext cx="0" cy="0"/>
+          <a:chOff x="0" y="0"/>
+          <a:chExt cx="0" cy="0"/>
+        </a:xfrm>
+      </p:grpSpPr>
+      <p:sp>
+        <p:nvSpPr>
+          <p:cNvPr id="2" name="Образ слайда 1"/>
+          <p:cNvSpPr>
+            <a:spLocks noGrp="1" noRot="1" noChangeAspect="1"/>
+          </p:cNvSpPr>
+          <p:nvPr>
+            <p:ph type="sldImg"/>
+          </p:nvPr>
+        </p:nvSpPr>
+        <p:spPr/>
+      </p:sp>
+      <p:sp>
+        <p:nvSpPr>
+          <p:cNvPr id="3" name="Заметки 2"/>
+          <p:cNvSpPr>
+            <a:spLocks noGrp="1"/>
+          </p:cNvSpPr>
+          <p:nvPr>
+            <p:ph type="body" idx="1"/>
+          </p:nvPr>
+        </p:nvSpPr>
+        <p:spPr/>
+        <p:txBody>
+          <a:bodyPr/>
+          <a:lstStyle/>
+          <a:p>
+            <a:pPr marL="0" indent="0">
+              <a:buNone/>
+            </a:pPr>
+            <a:endParaRPr lang="en-US" baseline="0" dirty="0" smtClean="0"/>
+          </a:p>
+        </p:txBody>
+      </p:sp>
+      <p:sp>
+        <p:nvSpPr>
+          <p:cNvPr id="4" name="Номер слайда 3"/>
+          <p:cNvSpPr>
+            <a:spLocks noGrp="1"/>
+          </p:cNvSpPr>
+          <p:nvPr>
+            <p:ph type="sldNum" sz="quarter" idx="10"/>
+          </p:nvPr>
+        </p:nvSpPr>
+        <p:spPr/>
+        <p:txBody>
+          <a:bodyPr/>
+          <a:lstStyle/>
+          <a:p>
+            <a:fld id="{72322572-43F4-4B03-89EA-3E2E4F93C9D1}" type="slidenum">
+              <a:rPr lang="en-US" smtClean="0"/>
+              <a:t>18</a:t>
+            </a:fld>
+            <a:endParaRPr lang="en-US"/>
+          </a:p>
+        </p:txBody>
+      </p:sp>
+    </p:spTree>
+    <p:extLst>
+      <p:ext uri="{BB962C8B-B14F-4D97-AF65-F5344CB8AC3E}">
+        <p14:creationId xmlns:p14="http://schemas.microsoft.com/office/powerpoint/2010/main" val="489106304"/>
+      </p:ext>
+    </p:extLst>
+  </p:cSld>
+  <p:clrMapOvr>
+    <a:masterClrMapping/>
+  </p:clrMapOvr>
+</p:notes>
+</file>
+
+<file path=ppt/notesSlides/notesSlide17.xml><?xml version="1.0" encoding="utf-8"?>
+<p:notes xmlns:a="http://schemas.openxmlformats.org/drawingml/2006/main" xmlns:r="http://schemas.openxmlformats.org/officeDocument/2006/relationships" xmlns:p="http://schemas.openxmlformats.org/presentationml/2006/main">
+  <p:cSld>
+    <p:spTree>
+      <p:nvGrpSpPr>
+        <p:cNvPr id="1" name=""/>
+        <p:cNvGrpSpPr/>
+        <p:nvPr/>
+      </p:nvGrpSpPr>
+      <p:grpSpPr>
+        <a:xfrm>
+          <a:off x="0" y="0"/>
+          <a:ext cx="0" cy="0"/>
+          <a:chOff x="0" y="0"/>
+          <a:chExt cx="0" cy="0"/>
+        </a:xfrm>
+      </p:grpSpPr>
+      <p:sp>
+        <p:nvSpPr>
+          <p:cNvPr id="2" name="Образ слайда 1"/>
+          <p:cNvSpPr>
+            <a:spLocks noGrp="1" noRot="1" noChangeAspect="1"/>
+          </p:cNvSpPr>
+          <p:nvPr>
+            <p:ph type="sldImg"/>
+          </p:nvPr>
+        </p:nvSpPr>
+        <p:spPr/>
+      </p:sp>
+      <p:sp>
+        <p:nvSpPr>
+          <p:cNvPr id="3" name="Заметки 2"/>
+          <p:cNvSpPr>
+            <a:spLocks noGrp="1"/>
+          </p:cNvSpPr>
+          <p:nvPr>
+            <p:ph type="body" idx="1"/>
+          </p:nvPr>
+        </p:nvSpPr>
+        <p:spPr/>
+        <p:txBody>
+          <a:bodyPr/>
+          <a:lstStyle/>
+          <a:p>
+            <a:pPr marL="0" indent="0">
+              <a:buFont typeface="+mj-lt"/>
+              <a:buNone/>
+            </a:pPr>
+            <a:endParaRPr lang="en-US" dirty="0" smtClean="0"/>
+          </a:p>
+        </p:txBody>
+      </p:sp>
+      <p:sp>
+        <p:nvSpPr>
+          <p:cNvPr id="4" name="Номер слайда 3"/>
+          <p:cNvSpPr>
+            <a:spLocks noGrp="1"/>
+          </p:cNvSpPr>
+          <p:nvPr>
+            <p:ph type="sldNum" sz="quarter" idx="10"/>
+          </p:nvPr>
+        </p:nvSpPr>
+        <p:spPr/>
+        <p:txBody>
+          <a:bodyPr/>
+          <a:lstStyle/>
+          <a:p>
+            <a:fld id="{72322572-43F4-4B03-89EA-3E2E4F93C9D1}" type="slidenum">
+              <a:rPr lang="en-US" smtClean="0"/>
+              <a:t>19</a:t>
             </a:fld>
             <a:endParaRPr lang="en-US"/>
           </a:p>
@@ -2613,7 +3067,7 @@
           <a:p>
             <a:fld id="{6E0645D3-1BEA-4FA9-AB54-C0B0A8D021AD}" type="datetime3">
               <a:rPr lang="en-US" smtClean="0"/>
-              <a:t>27 September 2021</a:t>
+              <a:t>30 September 2021</a:t>
             </a:fld>
             <a:endParaRPr lang="en-US" dirty="0"/>
           </a:p>
@@ -2864,7 +3318,7 @@
           <a:p>
             <a:fld id="{40AD50CD-C363-44DD-AE5B-203C5D40B13B}" type="datetime3">
               <a:rPr lang="en-US" smtClean="0"/>
-              <a:t>27 September 2021</a:t>
+              <a:t>30 September 2021</a:t>
             </a:fld>
             <a:endParaRPr lang="en-US" dirty="0"/>
           </a:p>
@@ -3178,7 +3632,7 @@
           <a:p>
             <a:fld id="{E7409F44-56A9-4002-AEB5-86A43D19CA2F}" type="datetime3">
               <a:rPr lang="en-US" smtClean="0"/>
-              <a:t>27 September 2021</a:t>
+              <a:t>30 September 2021</a:t>
             </a:fld>
             <a:endParaRPr lang="en-US" dirty="0"/>
           </a:p>
@@ -3511,7 +3965,7 @@
           <a:p>
             <a:fld id="{FFD852B1-13FD-4F6A-80A3-877B1622CBE7}" type="datetime3">
               <a:rPr lang="en-US" smtClean="0"/>
-              <a:t>27 September 2021</a:t>
+              <a:t>30 September 2021</a:t>
             </a:fld>
             <a:endParaRPr lang="en-US" dirty="0"/>
           </a:p>
@@ -3825,7 +4279,7 @@
           <a:p>
             <a:fld id="{43C90565-36C7-4CB4-BE45-1F37694E5E2A}" type="datetime3">
               <a:rPr lang="en-US" smtClean="0"/>
-              <a:t>27 September 2021</a:t>
+              <a:t>30 September 2021</a:t>
             </a:fld>
             <a:endParaRPr lang="en-US" dirty="0"/>
           </a:p>
@@ -4218,7 +4672,7 @@
           <a:p>
             <a:fld id="{D8422CB0-85AD-4000-A60E-F3ADFE1EC577}" type="datetime3">
               <a:rPr lang="en-US" smtClean="0"/>
-              <a:t>27 September 2021</a:t>
+              <a:t>30 September 2021</a:t>
             </a:fld>
             <a:endParaRPr lang="en-US" dirty="0"/>
           </a:p>
@@ -4388,7 +4842,7 @@
           <a:p>
             <a:fld id="{CCF8BAE4-1F19-418E-A8BB-79A48576D4EA}" type="datetime3">
               <a:rPr lang="en-US" smtClean="0"/>
-              <a:t>27 September 2021</a:t>
+              <a:t>30 September 2021</a:t>
             </a:fld>
             <a:endParaRPr lang="en-US" dirty="0"/>
           </a:p>
@@ -4567,7 +5021,7 @@
           <a:p>
             <a:fld id="{6C6EA9DF-4A8F-413F-8F6A-5AF9146BD61F}" type="datetime3">
               <a:rPr lang="en-US" smtClean="0"/>
-              <a:t>27 September 2021</a:t>
+              <a:t>30 September 2021</a:t>
             </a:fld>
             <a:endParaRPr lang="en-US" dirty="0"/>
           </a:p>
@@ -4737,7 +5191,7 @@
           <a:p>
             <a:fld id="{939306D3-16AC-481B-963B-74A1D01AC013}" type="datetime3">
               <a:rPr lang="en-US" smtClean="0"/>
-              <a:t>27 September 2021</a:t>
+              <a:t>30 September 2021</a:t>
             </a:fld>
             <a:endParaRPr lang="en-US" dirty="0"/>
           </a:p>
@@ -4983,7 +5437,7 @@
           <a:p>
             <a:fld id="{53B23675-A097-482E-93D9-DCDB34B0BA89}" type="datetime3">
               <a:rPr lang="en-US" smtClean="0"/>
-              <a:t>27 September 2021</a:t>
+              <a:t>30 September 2021</a:t>
             </a:fld>
             <a:endParaRPr lang="en-US" dirty="0"/>
           </a:p>
@@ -5215,7 +5669,7 @@
           <a:p>
             <a:fld id="{A3FD861C-0A67-4424-8F42-13A5AB039027}" type="datetime3">
               <a:rPr lang="en-US" smtClean="0"/>
-              <a:t>27 September 2021</a:t>
+              <a:t>30 September 2021</a:t>
             </a:fld>
             <a:endParaRPr lang="en-US" dirty="0"/>
           </a:p>
@@ -5588,7 +6042,7 @@
           <a:p>
             <a:fld id="{F48DCAEC-E29B-4D93-9DB9-AB8D1FE2D702}" type="datetime3">
               <a:rPr lang="en-US" smtClean="0"/>
-              <a:t>27 September 2021</a:t>
+              <a:t>30 September 2021</a:t>
             </a:fld>
             <a:endParaRPr lang="en-US" dirty="0"/>
           </a:p>
@@ -5711,7 +6165,7 @@
           <a:p>
             <a:fld id="{4C5CA901-B02A-4F2D-AC74-8ADE57E73DF4}" type="datetime3">
               <a:rPr lang="en-US" smtClean="0"/>
-              <a:t>27 September 2021</a:t>
+              <a:t>30 September 2021</a:t>
             </a:fld>
             <a:endParaRPr lang="en-US" dirty="0"/>
           </a:p>
@@ -5806,7 +6260,7 @@
           <a:p>
             <a:fld id="{D3480550-6EF3-49B0-AB5E-50034F2FFB28}" type="datetime3">
               <a:rPr lang="en-US" smtClean="0"/>
-              <a:t>27 September 2021</a:t>
+              <a:t>30 September 2021</a:t>
             </a:fld>
             <a:endParaRPr lang="en-US" dirty="0"/>
           </a:p>
@@ -6061,7 +6515,7 @@
           <a:p>
             <a:fld id="{47BAD964-252D-4C66-9406-7BE94E3F181D}" type="datetime3">
               <a:rPr lang="en-US" smtClean="0"/>
-              <a:t>27 September 2021</a:t>
+              <a:t>30 September 2021</a:t>
             </a:fld>
             <a:endParaRPr lang="en-US" dirty="0"/>
           </a:p>
@@ -6370,7 +6824,7 @@
           <a:p>
             <a:fld id="{67FF22B2-7B0E-40DF-9E30-4862C672A073}" type="datetime3">
               <a:rPr lang="en-US" smtClean="0"/>
-              <a:t>27 September 2021</a:t>
+              <a:t>30 September 2021</a:t>
             </a:fld>
             <a:endParaRPr lang="en-US" dirty="0"/>
           </a:p>
@@ -7067,7 +7521,7 @@
           <a:p>
             <a:fld id="{3CFD582D-0E09-44AB-BB3E-4722821CEBEA}" type="datetime3">
               <a:rPr lang="en-US" smtClean="0"/>
-              <a:t>27 September 2021</a:t>
+              <a:t>30 September 2021</a:t>
             </a:fld>
             <a:endParaRPr lang="en-US" dirty="0"/>
           </a:p>
@@ -7696,7 +8150,7 @@
           <a:p>
             <a:fld id="{E3705B4D-1726-4BAB-A90E-07379DAEAD37}" type="datetime3">
               <a:rPr lang="en-US" sz="1100" smtClean="0"/>
-              <a:t>27 September 2021</a:t>
+              <a:t>30 September 2021</a:t>
             </a:fld>
             <a:endParaRPr lang="en-US" sz="1100" dirty="0"/>
           </a:p>
@@ -8965,7 +9419,7 @@
           <a:p>
             <a:fld id="{939306D3-16AC-481B-963B-74A1D01AC013}" type="datetime3">
               <a:rPr lang="en-US" sz="1100" smtClean="0"/>
-              <a:t>27 September 2021</a:t>
+              <a:t>30 September 2021</a:t>
             </a:fld>
             <a:endParaRPr lang="en-US" sz="1100" dirty="0"/>
           </a:p>
@@ -9557,7 +10011,7 @@
           <a:p>
             <a:fld id="{939306D3-16AC-481B-963B-74A1D01AC013}" type="datetime3">
               <a:rPr lang="en-US" sz="1100" smtClean="0"/>
-              <a:t>27 September 2021</a:t>
+              <a:t>30 September 2021</a:t>
             </a:fld>
             <a:endParaRPr lang="en-US" sz="1100" dirty="0"/>
           </a:p>
@@ -10825,7 +11279,7 @@
           <a:p>
             <a:fld id="{E3705B4D-1726-4BAB-A90E-07379DAEAD37}" type="datetime3">
               <a:rPr lang="en-US" sz="1100" smtClean="0"/>
-              <a:t>27 September 2021</a:t>
+              <a:t>30 September 2021</a:t>
             </a:fld>
             <a:endParaRPr lang="en-US" sz="1100" dirty="0"/>
           </a:p>
@@ -11534,7 +11988,7 @@
           <a:p>
             <a:fld id="{939306D3-16AC-481B-963B-74A1D01AC013}" type="datetime3">
               <a:rPr lang="en-US" sz="1100" smtClean="0"/>
-              <a:t>27 September 2021</a:t>
+              <a:t>30 September 2021</a:t>
             </a:fld>
             <a:endParaRPr lang="en-US" sz="1100" dirty="0"/>
           </a:p>
@@ -12156,7 +12610,7 @@
           <a:p>
             <a:fld id="{E3705B4D-1726-4BAB-A90E-07379DAEAD37}" type="datetime3">
               <a:rPr lang="en-US" sz="1100" smtClean="0"/>
-              <a:t>27 September 2021</a:t>
+              <a:t>30 September 2021</a:t>
             </a:fld>
             <a:endParaRPr lang="en-US" sz="1100" dirty="0"/>
           </a:p>
@@ -12213,6 +12667,2766 @@
             <a:fld id="{519954A3-9DFD-4C44-94BA-B95130A3BA1C}" type="slidenum">
               <a:rPr lang="en-US" sz="1100" smtClean="0"/>
               <a:t>15</a:t>
+            </a:fld>
+            <a:endParaRPr lang="en-US" sz="1100" dirty="0"/>
+          </a:p>
+        </p:txBody>
+      </p:sp>
+      <p:sp>
+        <p:nvSpPr>
+          <p:cNvPr id="8" name="Заголовок 7"/>
+          <p:cNvSpPr>
+            <a:spLocks noGrp="1"/>
+          </p:cNvSpPr>
+          <p:nvPr>
+            <p:ph type="title"/>
+          </p:nvPr>
+        </p:nvSpPr>
+        <p:spPr>
+          <a:xfrm>
+            <a:off x="0" y="0"/>
+            <a:ext cx="12192000" cy="6858000"/>
+          </a:xfrm>
+          <a:solidFill>
+            <a:schemeClr val="accent2">
+              <a:lumMod val="75000"/>
+            </a:schemeClr>
+          </a:solidFill>
+        </p:spPr>
+        <p:txBody>
+          <a:bodyPr/>
+          <a:lstStyle/>
+          <a:p>
+            <a:r>
+              <a:rPr lang="en-US" dirty="0" smtClean="0"/>
+              <a:t/>
+            </a:r>
+            <a:br>
+              <a:rPr lang="en-US" dirty="0" smtClean="0"/>
+            </a:br>
+            <a:r>
+              <a:rPr lang="en-US" dirty="0"/>
+              <a:t/>
+            </a:r>
+            <a:br>
+              <a:rPr lang="en-US" dirty="0"/>
+            </a:br>
+            <a:r>
+              <a:rPr lang="en-US" dirty="0" smtClean="0"/>
+              <a:t/>
+            </a:r>
+            <a:br>
+              <a:rPr lang="en-US" dirty="0" smtClean="0"/>
+            </a:br>
+            <a:r>
+              <a:rPr lang="en-US" dirty="0"/>
+              <a:t/>
+            </a:r>
+            <a:br>
+              <a:rPr lang="en-US" dirty="0"/>
+            </a:br>
+            <a:r>
+              <a:rPr lang="en-US" dirty="0" smtClean="0"/>
+              <a:t/>
+            </a:r>
+            <a:br>
+              <a:rPr lang="en-US" dirty="0" smtClean="0"/>
+            </a:br>
+            <a:r>
+              <a:rPr lang="en-US" dirty="0"/>
+              <a:t/>
+            </a:r>
+            <a:br>
+              <a:rPr lang="en-US" dirty="0"/>
+            </a:br>
+            <a:r>
+              <a:rPr lang="en-US" dirty="0" smtClean="0"/>
+              <a:t/>
+            </a:r>
+            <a:br>
+              <a:rPr lang="en-US" dirty="0" smtClean="0"/>
+            </a:br>
+            <a:r>
+              <a:rPr lang="en-US" dirty="0"/>
+              <a:t/>
+            </a:r>
+            <a:br>
+              <a:rPr lang="en-US" dirty="0"/>
+            </a:br>
+            <a:r>
+              <a:rPr lang="en-US" dirty="0" smtClean="0"/>
+              <a:t>		</a:t>
+            </a:r>
+            <a:r>
+              <a:rPr lang="en-US" sz="6600" dirty="0" smtClean="0">
+                <a:solidFill>
+                  <a:schemeClr val="bg1"/>
+                </a:solidFill>
+              </a:rPr>
+              <a:t>C# basics</a:t>
+            </a:r>
+            <a:br>
+              <a:rPr lang="en-US" sz="6600" dirty="0" smtClean="0">
+                <a:solidFill>
+                  <a:schemeClr val="bg1"/>
+                </a:solidFill>
+              </a:rPr>
+            </a:br>
+            <a:r>
+              <a:rPr lang="en-US" dirty="0">
+                <a:solidFill>
+                  <a:schemeClr val="bg1"/>
+                </a:solidFill>
+              </a:rPr>
+              <a:t>	</a:t>
+            </a:r>
+            <a:r>
+              <a:rPr lang="en-US" dirty="0" smtClean="0">
+                <a:solidFill>
+                  <a:schemeClr val="bg1"/>
+                </a:solidFill>
+              </a:rPr>
+              <a:t>	Conditional Statements</a:t>
+            </a:r>
+            <a:r>
+              <a:rPr lang="en-US" dirty="0" smtClean="0"/>
+              <a:t/>
+            </a:r>
+            <a:br>
+              <a:rPr lang="en-US" dirty="0" smtClean="0"/>
+            </a:br>
+            <a:r>
+              <a:rPr lang="en-US" dirty="0"/>
+              <a:t>	</a:t>
+            </a:r>
+          </a:p>
+        </p:txBody>
+      </p:sp>
+    </p:spTree>
+    <p:extLst>
+      <p:ext uri="{BB962C8B-B14F-4D97-AF65-F5344CB8AC3E}">
+        <p14:creationId xmlns:p14="http://schemas.microsoft.com/office/powerpoint/2010/main" val="1026322810"/>
+      </p:ext>
+    </p:extLst>
+  </p:cSld>
+  <p:clrMapOvr>
+    <a:masterClrMapping/>
+  </p:clrMapOvr>
+  <p:timing>
+    <p:tnLst>
+      <p:par>
+        <p:cTn id="1" dur="indefinite" restart="never" nodeType="tmRoot"/>
+      </p:par>
+    </p:tnLst>
+  </p:timing>
+</p:sld>
+</file>
+
+<file path=ppt/slides/slide16.xml><?xml version="1.0" encoding="utf-8"?>
+<p:sld xmlns:a="http://schemas.openxmlformats.org/drawingml/2006/main" xmlns:r="http://schemas.openxmlformats.org/officeDocument/2006/relationships" xmlns:p="http://schemas.openxmlformats.org/presentationml/2006/main">
+  <p:cSld>
+    <p:spTree>
+      <p:nvGrpSpPr>
+        <p:cNvPr id="1" name=""/>
+        <p:cNvGrpSpPr/>
+        <p:nvPr/>
+      </p:nvGrpSpPr>
+      <p:grpSpPr>
+        <a:xfrm>
+          <a:off x="0" y="0"/>
+          <a:ext cx="0" cy="0"/>
+          <a:chOff x="0" y="0"/>
+          <a:chExt cx="0" cy="0"/>
+        </a:xfrm>
+      </p:grpSpPr>
+      <p:sp>
+        <p:nvSpPr>
+          <p:cNvPr id="2" name="Заголовок 1"/>
+          <p:cNvSpPr>
+            <a:spLocks noGrp="1"/>
+          </p:cNvSpPr>
+          <p:nvPr>
+            <p:ph type="title"/>
+          </p:nvPr>
+        </p:nvSpPr>
+        <p:spPr/>
+        <p:txBody>
+          <a:bodyPr/>
+          <a:lstStyle/>
+          <a:p>
+            <a:r>
+              <a:rPr lang="en-US" dirty="0"/>
+              <a:t>C# </a:t>
+            </a:r>
+            <a:r>
+              <a:rPr lang="en-US" dirty="0" smtClean="0"/>
+              <a:t>basics</a:t>
+            </a:r>
+            <a:br>
+              <a:rPr lang="en-US" dirty="0" smtClean="0"/>
+            </a:br>
+            <a:r>
+              <a:rPr lang="en-US" sz="2400" dirty="0" smtClean="0">
+                <a:solidFill>
+                  <a:prstClr val="white">
+                    <a:lumMod val="50000"/>
+                  </a:prstClr>
+                </a:solidFill>
+              </a:rPr>
+              <a:t>Conditional statements</a:t>
+            </a:r>
+            <a:endParaRPr lang="en-US" dirty="0"/>
+          </a:p>
+        </p:txBody>
+      </p:sp>
+      <p:sp>
+        <p:nvSpPr>
+          <p:cNvPr id="4" name="Дата 3"/>
+          <p:cNvSpPr>
+            <a:spLocks noGrp="1"/>
+          </p:cNvSpPr>
+          <p:nvPr>
+            <p:ph type="dt" sz="half" idx="10"/>
+          </p:nvPr>
+        </p:nvSpPr>
+        <p:spPr>
+          <a:xfrm>
+            <a:off x="6598153" y="6041362"/>
+            <a:ext cx="1518920" cy="365125"/>
+          </a:xfrm>
+        </p:spPr>
+        <p:txBody>
+          <a:bodyPr/>
+          <a:lstStyle/>
+          <a:p>
+            <a:fld id="{939306D3-16AC-481B-963B-74A1D01AC013}" type="datetime3">
+              <a:rPr lang="en-US" sz="1100" smtClean="0"/>
+              <a:t>30 September 2021</a:t>
+            </a:fld>
+            <a:endParaRPr lang="en-US" sz="1100" dirty="0"/>
+          </a:p>
+        </p:txBody>
+      </p:sp>
+      <p:sp>
+        <p:nvSpPr>
+          <p:cNvPr id="5" name="Нижний колонтитул 4"/>
+          <p:cNvSpPr>
+            <a:spLocks noGrp="1"/>
+          </p:cNvSpPr>
+          <p:nvPr>
+            <p:ph type="ftr" sz="quarter" idx="11"/>
+          </p:nvPr>
+        </p:nvSpPr>
+        <p:spPr/>
+        <p:txBody>
+          <a:bodyPr/>
+          <a:lstStyle/>
+          <a:p>
+            <a:r>
+              <a:rPr lang="en-US" sz="1100" dirty="0" smtClean="0"/>
+              <a:t>Automated framework with C#</a:t>
+            </a:r>
+          </a:p>
+          <a:p>
+            <a:r>
+              <a:rPr lang="en-US" sz="1100" dirty="0"/>
+              <a:t>Yury </a:t>
+            </a:r>
+            <a:r>
+              <a:rPr lang="en-US" sz="1100" dirty="0" smtClean="0"/>
+              <a:t>Alifanov</a:t>
+            </a:r>
+            <a:endParaRPr lang="en-US" sz="1100" dirty="0"/>
+          </a:p>
+        </p:txBody>
+      </p:sp>
+      <p:sp>
+        <p:nvSpPr>
+          <p:cNvPr id="6" name="Номер слайда 5"/>
+          <p:cNvSpPr>
+            <a:spLocks noGrp="1"/>
+          </p:cNvSpPr>
+          <p:nvPr>
+            <p:ph type="sldNum" sz="quarter" idx="12"/>
+          </p:nvPr>
+        </p:nvSpPr>
+        <p:spPr/>
+        <p:txBody>
+          <a:bodyPr/>
+          <a:lstStyle/>
+          <a:p>
+            <a:fld id="{519954A3-9DFD-4C44-94BA-B95130A3BA1C}" type="slidenum">
+              <a:rPr lang="en-US" sz="1100" smtClean="0"/>
+              <a:t>16</a:t>
+            </a:fld>
+            <a:endParaRPr lang="en-US" sz="1100" dirty="0"/>
+          </a:p>
+        </p:txBody>
+      </p:sp>
+      <p:sp>
+        <p:nvSpPr>
+          <p:cNvPr id="3" name="Объект 2"/>
+          <p:cNvSpPr>
+            <a:spLocks noGrp="1"/>
+          </p:cNvSpPr>
+          <p:nvPr>
+            <p:ph idx="1"/>
+          </p:nvPr>
+        </p:nvSpPr>
+        <p:spPr>
+          <a:xfrm>
+            <a:off x="677334" y="1708944"/>
+            <a:ext cx="8596668" cy="4091781"/>
+          </a:xfrm>
+        </p:spPr>
+        <p:txBody>
+          <a:bodyPr>
+            <a:normAutofit/>
+          </a:bodyPr>
+          <a:lstStyle/>
+          <a:p>
+            <a:pPr marL="0" indent="0">
+              <a:buNone/>
+            </a:pPr>
+            <a:r>
+              <a:rPr lang="en-US" dirty="0" smtClean="0"/>
+              <a:t>Comparison operators:</a:t>
+            </a:r>
+          </a:p>
+          <a:p>
+            <a:pPr marL="0" indent="0">
+              <a:buNone/>
+            </a:pPr>
+            <a:endParaRPr lang="en-US" dirty="0"/>
+          </a:p>
+          <a:p>
+            <a:pPr marL="0" indent="0">
+              <a:buNone/>
+            </a:pPr>
+            <a:endParaRPr lang="en-US" dirty="0" smtClean="0"/>
+          </a:p>
+          <a:p>
+            <a:pPr marL="0" indent="0">
+              <a:buNone/>
+            </a:pPr>
+            <a:endParaRPr lang="en-US" dirty="0"/>
+          </a:p>
+          <a:p>
+            <a:pPr marL="0" indent="0">
+              <a:buNone/>
+            </a:pPr>
+            <a:endParaRPr lang="en-US" dirty="0" smtClean="0"/>
+          </a:p>
+          <a:p>
+            <a:pPr marL="0" indent="0">
+              <a:buNone/>
+            </a:pPr>
+            <a:endParaRPr lang="en-US" dirty="0"/>
+          </a:p>
+          <a:p>
+            <a:pPr marL="0" indent="0">
+              <a:buNone/>
+            </a:pPr>
+            <a:r>
+              <a:rPr lang="en-US" dirty="0" smtClean="0"/>
+              <a:t>Logical </a:t>
+            </a:r>
+            <a:r>
+              <a:rPr lang="en-US" dirty="0"/>
+              <a:t>operators</a:t>
+            </a:r>
+            <a:r>
+              <a:rPr lang="en-US" dirty="0" smtClean="0"/>
+              <a:t>:</a:t>
+            </a:r>
+          </a:p>
+          <a:p>
+            <a:pPr marL="0" indent="0">
+              <a:buNone/>
+            </a:pPr>
+            <a:endParaRPr lang="en-US" dirty="0" smtClean="0"/>
+          </a:p>
+          <a:p>
+            <a:pPr marL="0" indent="0">
+              <a:buNone/>
+            </a:pPr>
+            <a:r>
+              <a:rPr lang="en-US" dirty="0"/>
+              <a:t>	</a:t>
+            </a:r>
+          </a:p>
+        </p:txBody>
+      </p:sp>
+      <p:graphicFrame>
+        <p:nvGraphicFramePr>
+          <p:cNvPr id="7" name="Таблица 6"/>
+          <p:cNvGraphicFramePr>
+            <a:graphicFrameLocks noGrp="1"/>
+          </p:cNvGraphicFramePr>
+          <p:nvPr>
+            <p:extLst>
+              <p:ext uri="{D42A27DB-BD31-4B8C-83A1-F6EECF244321}">
+                <p14:modId xmlns:p14="http://schemas.microsoft.com/office/powerpoint/2010/main" val="4186423978"/>
+              </p:ext>
+            </p:extLst>
+          </p:nvPr>
+        </p:nvGraphicFramePr>
+        <p:xfrm>
+          <a:off x="677334" y="2155560"/>
+          <a:ext cx="6783392" cy="1957556"/>
+        </p:xfrm>
+        <a:graphic>
+          <a:graphicData uri="http://schemas.openxmlformats.org/drawingml/2006/table">
+            <a:tbl>
+              <a:tblPr firstRow="1" bandRow="1">
+                <a:tableStyleId>{5C22544A-7EE6-4342-B048-85BDC9FD1C3A}</a:tableStyleId>
+              </a:tblPr>
+              <a:tblGrid>
+                <a:gridCol w="3391696">
+                  <a:extLst>
+                    <a:ext uri="{9D8B030D-6E8A-4147-A177-3AD203B41FA5}">
+                      <a16:colId xmlns:a16="http://schemas.microsoft.com/office/drawing/2014/main" val="3133516242"/>
+                    </a:ext>
+                  </a:extLst>
+                </a:gridCol>
+                <a:gridCol w="3391696">
+                  <a:extLst>
+                    <a:ext uri="{9D8B030D-6E8A-4147-A177-3AD203B41FA5}">
+                      <a16:colId xmlns:a16="http://schemas.microsoft.com/office/drawing/2014/main" val="3490960151"/>
+                    </a:ext>
+                  </a:extLst>
+                </a:gridCol>
+              </a:tblGrid>
+              <a:tr h="243224">
+                <a:tc>
+                  <a:txBody>
+                    <a:bodyPr/>
+                    <a:lstStyle/>
+                    <a:p>
+                      <a:pPr algn="ctr"/>
+                      <a:r>
+                        <a:rPr lang="en-US" sz="1200" dirty="0" smtClean="0"/>
+                        <a:t>Operator</a:t>
+                      </a:r>
+                      <a:endParaRPr lang="en-US" sz="1200" dirty="0"/>
+                    </a:p>
+                  </a:txBody>
+                  <a:tcPr/>
+                </a:tc>
+                <a:tc>
+                  <a:txBody>
+                    <a:bodyPr/>
+                    <a:lstStyle/>
+                    <a:p>
+                      <a:pPr algn="ctr"/>
+                      <a:r>
+                        <a:rPr lang="en-US" sz="1200" dirty="0" smtClean="0"/>
+                        <a:t>Action</a:t>
+                      </a:r>
+                      <a:endParaRPr lang="en-US" sz="1200" dirty="0"/>
+                    </a:p>
+                  </a:txBody>
+                  <a:tcPr/>
+                </a:tc>
+                <a:extLst>
+                  <a:ext uri="{0D108BD9-81ED-4DB2-BD59-A6C34878D82A}">
+                    <a16:rowId xmlns:a16="http://schemas.microsoft.com/office/drawing/2014/main" val="3794196161"/>
+                  </a:ext>
+                </a:extLst>
+              </a:tr>
+              <a:tr h="243224">
+                <a:tc>
+                  <a:txBody>
+                    <a:bodyPr/>
+                    <a:lstStyle/>
+                    <a:p>
+                      <a:pPr algn="ctr"/>
+                      <a:r>
+                        <a:rPr lang="en-US" sz="1200" dirty="0" smtClean="0"/>
+                        <a:t>==</a:t>
+                      </a:r>
+                      <a:endParaRPr lang="en-US" sz="1200" dirty="0"/>
+                    </a:p>
+                  </a:txBody>
+                  <a:tcPr/>
+                </a:tc>
+                <a:tc>
+                  <a:txBody>
+                    <a:bodyPr/>
+                    <a:lstStyle/>
+                    <a:p>
+                      <a:r>
+                        <a:rPr lang="en-US" sz="1200" dirty="0" smtClean="0"/>
+                        <a:t>Equal to</a:t>
+                      </a:r>
+                      <a:endParaRPr lang="en-US" sz="1200" dirty="0"/>
+                    </a:p>
+                  </a:txBody>
+                  <a:tcPr/>
+                </a:tc>
+                <a:extLst>
+                  <a:ext uri="{0D108BD9-81ED-4DB2-BD59-A6C34878D82A}">
+                    <a16:rowId xmlns:a16="http://schemas.microsoft.com/office/drawing/2014/main" val="913896234"/>
+                  </a:ext>
+                </a:extLst>
+              </a:tr>
+              <a:tr h="243224">
+                <a:tc>
+                  <a:txBody>
+                    <a:bodyPr/>
+                    <a:lstStyle/>
+                    <a:p>
+                      <a:pPr algn="ctr"/>
+                      <a:r>
+                        <a:rPr lang="en-US" sz="1200" dirty="0" smtClean="0"/>
+                        <a:t>!=</a:t>
+                      </a:r>
+                      <a:endParaRPr lang="en-US" sz="1200" dirty="0"/>
+                    </a:p>
+                  </a:txBody>
+                  <a:tcPr/>
+                </a:tc>
+                <a:tc>
+                  <a:txBody>
+                    <a:bodyPr/>
+                    <a:lstStyle/>
+                    <a:p>
+                      <a:r>
+                        <a:rPr lang="en-US" sz="1200" dirty="0" smtClean="0"/>
+                        <a:t>Not equal to</a:t>
+                      </a:r>
+                      <a:endParaRPr lang="en-US" sz="1200" dirty="0"/>
+                    </a:p>
+                  </a:txBody>
+                  <a:tcPr/>
+                </a:tc>
+                <a:extLst>
+                  <a:ext uri="{0D108BD9-81ED-4DB2-BD59-A6C34878D82A}">
+                    <a16:rowId xmlns:a16="http://schemas.microsoft.com/office/drawing/2014/main" val="2484218268"/>
+                  </a:ext>
+                </a:extLst>
+              </a:tr>
+              <a:tr h="243224">
+                <a:tc>
+                  <a:txBody>
+                    <a:bodyPr/>
+                    <a:lstStyle/>
+                    <a:p>
+                      <a:pPr algn="ctr"/>
+                      <a:r>
+                        <a:rPr lang="en-US" sz="1200" dirty="0" smtClean="0"/>
+                        <a:t>&gt;</a:t>
+                      </a:r>
+                      <a:endParaRPr lang="en-US" sz="1200" dirty="0"/>
+                    </a:p>
+                  </a:txBody>
+                  <a:tcPr/>
+                </a:tc>
+                <a:tc>
+                  <a:txBody>
+                    <a:bodyPr/>
+                    <a:lstStyle/>
+                    <a:p>
+                      <a:r>
+                        <a:rPr lang="en-US" sz="1200" dirty="0" smtClean="0"/>
+                        <a:t>Greater than</a:t>
+                      </a:r>
+                      <a:endParaRPr lang="en-US" sz="1200" dirty="0"/>
+                    </a:p>
+                  </a:txBody>
+                  <a:tcPr/>
+                </a:tc>
+                <a:extLst>
+                  <a:ext uri="{0D108BD9-81ED-4DB2-BD59-A6C34878D82A}">
+                    <a16:rowId xmlns:a16="http://schemas.microsoft.com/office/drawing/2014/main" val="3488025333"/>
+                  </a:ext>
+                </a:extLst>
+              </a:tr>
+              <a:tr h="292978">
+                <a:tc>
+                  <a:txBody>
+                    <a:bodyPr/>
+                    <a:lstStyle/>
+                    <a:p>
+                      <a:pPr algn="ctr"/>
+                      <a:r>
+                        <a:rPr lang="en-US" sz="1200" dirty="0" smtClean="0"/>
+                        <a:t>&gt;=</a:t>
+                      </a:r>
+                      <a:endParaRPr lang="en-US" sz="1200" dirty="0"/>
+                    </a:p>
+                  </a:txBody>
+                  <a:tcPr/>
+                </a:tc>
+                <a:tc>
+                  <a:txBody>
+                    <a:bodyPr/>
+                    <a:lstStyle/>
+                    <a:p>
+                      <a:r>
+                        <a:rPr lang="en-US" sz="1200" dirty="0" smtClean="0"/>
+                        <a:t>Greater than or equal</a:t>
+                      </a:r>
+                      <a:r>
+                        <a:rPr lang="en-US" sz="1200" baseline="0" dirty="0" smtClean="0"/>
+                        <a:t> to</a:t>
+                      </a:r>
+                      <a:endParaRPr lang="en-US" sz="1200" dirty="0"/>
+                    </a:p>
+                  </a:txBody>
+                  <a:tcPr/>
+                </a:tc>
+                <a:extLst>
+                  <a:ext uri="{0D108BD9-81ED-4DB2-BD59-A6C34878D82A}">
+                    <a16:rowId xmlns:a16="http://schemas.microsoft.com/office/drawing/2014/main" val="2905249046"/>
+                  </a:ext>
+                </a:extLst>
+              </a:tr>
+              <a:tr h="243224">
+                <a:tc>
+                  <a:txBody>
+                    <a:bodyPr/>
+                    <a:lstStyle/>
+                    <a:p>
+                      <a:pPr algn="ctr"/>
+                      <a:r>
+                        <a:rPr lang="en-US" sz="1200" dirty="0" smtClean="0"/>
+                        <a:t>&lt;</a:t>
+                      </a:r>
+                      <a:endParaRPr lang="en-US" sz="1200" dirty="0"/>
+                    </a:p>
+                  </a:txBody>
+                  <a:tcPr/>
+                </a:tc>
+                <a:tc>
+                  <a:txBody>
+                    <a:bodyPr/>
+                    <a:lstStyle/>
+                    <a:p>
+                      <a:r>
+                        <a:rPr lang="en-US" sz="1200" dirty="0" smtClean="0"/>
+                        <a:t>Less than</a:t>
+                      </a:r>
+                      <a:endParaRPr lang="en-US" sz="1200" dirty="0"/>
+                    </a:p>
+                  </a:txBody>
+                  <a:tcPr/>
+                </a:tc>
+                <a:extLst>
+                  <a:ext uri="{0D108BD9-81ED-4DB2-BD59-A6C34878D82A}">
+                    <a16:rowId xmlns:a16="http://schemas.microsoft.com/office/drawing/2014/main" val="3747553816"/>
+                  </a:ext>
+                </a:extLst>
+              </a:tr>
+              <a:tr h="292978">
+                <a:tc>
+                  <a:txBody>
+                    <a:bodyPr/>
+                    <a:lstStyle/>
+                    <a:p>
+                      <a:pPr algn="ctr"/>
+                      <a:r>
+                        <a:rPr lang="en-US" sz="1200" dirty="0" smtClean="0"/>
+                        <a:t>&lt;=</a:t>
+                      </a:r>
+                      <a:endParaRPr lang="en-US" sz="1200" dirty="0"/>
+                    </a:p>
+                  </a:txBody>
+                  <a:tcPr/>
+                </a:tc>
+                <a:tc>
+                  <a:txBody>
+                    <a:bodyPr/>
+                    <a:lstStyle/>
+                    <a:p>
+                      <a:r>
+                        <a:rPr lang="en-US" sz="1200" dirty="0" smtClean="0"/>
+                        <a:t>Less than or equal</a:t>
+                      </a:r>
+                      <a:r>
+                        <a:rPr lang="en-US" sz="1200" baseline="0" dirty="0" smtClean="0"/>
+                        <a:t> to</a:t>
+                      </a:r>
+                      <a:endParaRPr lang="en-US" sz="1200" dirty="0"/>
+                    </a:p>
+                  </a:txBody>
+                  <a:tcPr/>
+                </a:tc>
+                <a:extLst>
+                  <a:ext uri="{0D108BD9-81ED-4DB2-BD59-A6C34878D82A}">
+                    <a16:rowId xmlns:a16="http://schemas.microsoft.com/office/drawing/2014/main" val="3968139894"/>
+                  </a:ext>
+                </a:extLst>
+              </a:tr>
+            </a:tbl>
+          </a:graphicData>
+        </a:graphic>
+      </p:graphicFrame>
+      <p:graphicFrame>
+        <p:nvGraphicFramePr>
+          <p:cNvPr id="8" name="Таблица 7"/>
+          <p:cNvGraphicFramePr>
+            <a:graphicFrameLocks noGrp="1"/>
+          </p:cNvGraphicFramePr>
+          <p:nvPr>
+            <p:extLst>
+              <p:ext uri="{D42A27DB-BD31-4B8C-83A1-F6EECF244321}">
+                <p14:modId xmlns:p14="http://schemas.microsoft.com/office/powerpoint/2010/main" val="4237244023"/>
+              </p:ext>
+            </p:extLst>
+          </p:nvPr>
+        </p:nvGraphicFramePr>
+        <p:xfrm>
+          <a:off x="677334" y="4571910"/>
+          <a:ext cx="6783392" cy="1097280"/>
+        </p:xfrm>
+        <a:graphic>
+          <a:graphicData uri="http://schemas.openxmlformats.org/drawingml/2006/table">
+            <a:tbl>
+              <a:tblPr firstRow="1" bandRow="1">
+                <a:tableStyleId>{5C22544A-7EE6-4342-B048-85BDC9FD1C3A}</a:tableStyleId>
+              </a:tblPr>
+              <a:tblGrid>
+                <a:gridCol w="3391696">
+                  <a:extLst>
+                    <a:ext uri="{9D8B030D-6E8A-4147-A177-3AD203B41FA5}">
+                      <a16:colId xmlns:a16="http://schemas.microsoft.com/office/drawing/2014/main" val="16089859"/>
+                    </a:ext>
+                  </a:extLst>
+                </a:gridCol>
+                <a:gridCol w="3391696">
+                  <a:extLst>
+                    <a:ext uri="{9D8B030D-6E8A-4147-A177-3AD203B41FA5}">
+                      <a16:colId xmlns:a16="http://schemas.microsoft.com/office/drawing/2014/main" val="1126223555"/>
+                    </a:ext>
+                  </a:extLst>
+                </a:gridCol>
+              </a:tblGrid>
+              <a:tr h="266127">
+                <a:tc>
+                  <a:txBody>
+                    <a:bodyPr/>
+                    <a:lstStyle/>
+                    <a:p>
+                      <a:pPr algn="ctr"/>
+                      <a:r>
+                        <a:rPr lang="en-US" sz="1200" dirty="0" smtClean="0"/>
+                        <a:t>Operator</a:t>
+                      </a:r>
+                      <a:endParaRPr lang="en-US" sz="1200" dirty="0"/>
+                    </a:p>
+                  </a:txBody>
+                  <a:tcPr/>
+                </a:tc>
+                <a:tc>
+                  <a:txBody>
+                    <a:bodyPr/>
+                    <a:lstStyle/>
+                    <a:p>
+                      <a:pPr algn="ctr"/>
+                      <a:r>
+                        <a:rPr lang="en-US" sz="1200" dirty="0" smtClean="0"/>
+                        <a:t>Action</a:t>
+                      </a:r>
+                      <a:endParaRPr lang="en-US" sz="1200" dirty="0"/>
+                    </a:p>
+                  </a:txBody>
+                  <a:tcPr/>
+                </a:tc>
+                <a:extLst>
+                  <a:ext uri="{0D108BD9-81ED-4DB2-BD59-A6C34878D82A}">
+                    <a16:rowId xmlns:a16="http://schemas.microsoft.com/office/drawing/2014/main" val="1979482532"/>
+                  </a:ext>
+                </a:extLst>
+              </a:tr>
+              <a:tr h="266127">
+                <a:tc>
+                  <a:txBody>
+                    <a:bodyPr/>
+                    <a:lstStyle/>
+                    <a:p>
+                      <a:pPr algn="ctr"/>
+                      <a:r>
+                        <a:rPr lang="en-US" sz="1200" dirty="0" smtClean="0">
+                          <a:latin typeface="Arial" panose="020B0604020202020204" pitchFamily="34" charset="0"/>
+                          <a:cs typeface="Arial" panose="020B0604020202020204" pitchFamily="34" charset="0"/>
+                        </a:rPr>
+                        <a:t>&amp;&amp;</a:t>
+                      </a:r>
+                      <a:endParaRPr lang="en-US" sz="1200" dirty="0">
+                        <a:latin typeface="Arial" panose="020B0604020202020204" pitchFamily="34" charset="0"/>
+                        <a:cs typeface="Arial" panose="020B0604020202020204" pitchFamily="34" charset="0"/>
+                      </a:endParaRPr>
+                    </a:p>
+                  </a:txBody>
+                  <a:tcPr/>
+                </a:tc>
+                <a:tc>
+                  <a:txBody>
+                    <a:bodyPr/>
+                    <a:lstStyle/>
+                    <a:p>
+                      <a:r>
+                        <a:rPr lang="en-US" sz="1200" dirty="0" smtClean="0"/>
+                        <a:t>And</a:t>
+                      </a:r>
+                      <a:endParaRPr lang="en-US" sz="1200" dirty="0"/>
+                    </a:p>
+                  </a:txBody>
+                  <a:tcPr/>
+                </a:tc>
+                <a:extLst>
+                  <a:ext uri="{0D108BD9-81ED-4DB2-BD59-A6C34878D82A}">
+                    <a16:rowId xmlns:a16="http://schemas.microsoft.com/office/drawing/2014/main" val="2620513956"/>
+                  </a:ext>
+                </a:extLst>
+              </a:tr>
+              <a:tr h="266127">
+                <a:tc>
+                  <a:txBody>
+                    <a:bodyPr/>
+                    <a:lstStyle/>
+                    <a:p>
+                      <a:pPr algn="ctr"/>
+                      <a:r>
+                        <a:rPr lang="en-US" sz="1200" dirty="0" smtClean="0"/>
+                        <a:t>||</a:t>
+                      </a:r>
+                      <a:endParaRPr lang="en-US" sz="1200" dirty="0"/>
+                    </a:p>
+                  </a:txBody>
+                  <a:tcPr/>
+                </a:tc>
+                <a:tc>
+                  <a:txBody>
+                    <a:bodyPr/>
+                    <a:lstStyle/>
+                    <a:p>
+                      <a:r>
+                        <a:rPr lang="en-US" sz="1200" dirty="0" smtClean="0"/>
+                        <a:t>Or</a:t>
+                      </a:r>
+                      <a:endParaRPr lang="en-US" sz="1200" dirty="0"/>
+                    </a:p>
+                  </a:txBody>
+                  <a:tcPr/>
+                </a:tc>
+                <a:extLst>
+                  <a:ext uri="{0D108BD9-81ED-4DB2-BD59-A6C34878D82A}">
+                    <a16:rowId xmlns:a16="http://schemas.microsoft.com/office/drawing/2014/main" val="3046782225"/>
+                  </a:ext>
+                </a:extLst>
+              </a:tr>
+              <a:tr h="266127">
+                <a:tc>
+                  <a:txBody>
+                    <a:bodyPr/>
+                    <a:lstStyle/>
+                    <a:p>
+                      <a:pPr algn="ctr"/>
+                      <a:r>
+                        <a:rPr lang="en-US" sz="1200" dirty="0" smtClean="0"/>
+                        <a:t>!</a:t>
+                      </a:r>
+                      <a:endParaRPr lang="en-US" sz="1200" dirty="0"/>
+                    </a:p>
+                  </a:txBody>
+                  <a:tcPr/>
+                </a:tc>
+                <a:tc>
+                  <a:txBody>
+                    <a:bodyPr/>
+                    <a:lstStyle/>
+                    <a:p>
+                      <a:r>
+                        <a:rPr lang="en-US" sz="1200" dirty="0" smtClean="0"/>
+                        <a:t>Not</a:t>
+                      </a:r>
+                      <a:endParaRPr lang="en-US" sz="1200" dirty="0"/>
+                    </a:p>
+                  </a:txBody>
+                  <a:tcPr/>
+                </a:tc>
+                <a:extLst>
+                  <a:ext uri="{0D108BD9-81ED-4DB2-BD59-A6C34878D82A}">
+                    <a16:rowId xmlns:a16="http://schemas.microsoft.com/office/drawing/2014/main" val="2364125335"/>
+                  </a:ext>
+                </a:extLst>
+              </a:tr>
+            </a:tbl>
+          </a:graphicData>
+        </a:graphic>
+      </p:graphicFrame>
+    </p:spTree>
+    <p:extLst>
+      <p:ext uri="{BB962C8B-B14F-4D97-AF65-F5344CB8AC3E}">
+        <p14:creationId xmlns:p14="http://schemas.microsoft.com/office/powerpoint/2010/main" val="3231392812"/>
+      </p:ext>
+    </p:extLst>
+  </p:cSld>
+  <p:clrMapOvr>
+    <a:masterClrMapping/>
+  </p:clrMapOvr>
+  <p:timing>
+    <p:tnLst>
+      <p:par>
+        <p:cTn id="1" dur="indefinite" restart="never" nodeType="tmRoot">
+          <p:childTnLst>
+            <p:seq concurrent="1" nextAc="seek">
+              <p:cTn id="2" dur="indefinite" nodeType="mainSeq">
+                <p:childTnLst>
+                  <p:par>
+                    <p:cTn id="3" fill="hold">
+                      <p:stCondLst>
+                        <p:cond delay="indefinite"/>
+                      </p:stCondLst>
+                      <p:childTnLst>
+                        <p:par>
+                          <p:cTn id="4" fill="hold">
+                            <p:stCondLst>
+                              <p:cond delay="0"/>
+                            </p:stCondLst>
+                            <p:childTnLst>
+                              <p:par>
+                                <p:cTn id="5" presetID="47" presetClass="entr" presetSubtype="0" fill="hold" grpId="0" nodeType="clickEffect">
+                                  <p:stCondLst>
+                                    <p:cond delay="0"/>
+                                  </p:stCondLst>
+                                  <p:childTnLst>
+                                    <p:set>
+                                      <p:cBhvr>
+                                        <p:cTn id="6" dur="1" fill="hold">
+                                          <p:stCondLst>
+                                            <p:cond delay="0"/>
+                                          </p:stCondLst>
+                                        </p:cTn>
+                                        <p:tgtEl>
+                                          <p:spTgt spid="3">
+                                            <p:txEl>
+                                              <p:pRg st="0" end="0"/>
+                                            </p:txEl>
+                                          </p:spTgt>
+                                        </p:tgtEl>
+                                        <p:attrNameLst>
+                                          <p:attrName>style.visibility</p:attrName>
+                                        </p:attrNameLst>
+                                      </p:cBhvr>
+                                      <p:to>
+                                        <p:strVal val="visible"/>
+                                      </p:to>
+                                    </p:set>
+                                    <p:animEffect transition="in" filter="fade">
+                                      <p:cBhvr>
+                                        <p:cTn id="7" dur="1000"/>
+                                        <p:tgtEl>
+                                          <p:spTgt spid="3">
+                                            <p:txEl>
+                                              <p:pRg st="0" end="0"/>
+                                            </p:txEl>
+                                          </p:spTgt>
+                                        </p:tgtEl>
+                                      </p:cBhvr>
+                                    </p:animEffect>
+                                    <p:anim calcmode="lin" valueType="num">
+                                      <p:cBhvr>
+                                        <p:cTn id="8" dur="1000" fill="hold"/>
+                                        <p:tgtEl>
+                                          <p:spTgt spid="3">
+                                            <p:txEl>
+                                              <p:pRg st="0" end="0"/>
+                                            </p:txEl>
+                                          </p:spTgt>
+                                        </p:tgtEl>
+                                        <p:attrNameLst>
+                                          <p:attrName>ppt_x</p:attrName>
+                                        </p:attrNameLst>
+                                      </p:cBhvr>
+                                      <p:tavLst>
+                                        <p:tav tm="0">
+                                          <p:val>
+                                            <p:strVal val="#ppt_x"/>
+                                          </p:val>
+                                        </p:tav>
+                                        <p:tav tm="100000">
+                                          <p:val>
+                                            <p:strVal val="#ppt_x"/>
+                                          </p:val>
+                                        </p:tav>
+                                      </p:tavLst>
+                                    </p:anim>
+                                    <p:anim calcmode="lin" valueType="num">
+                                      <p:cBhvr>
+                                        <p:cTn id="9" dur="1000" fill="hold"/>
+                                        <p:tgtEl>
+                                          <p:spTgt spid="3">
+                                            <p:txEl>
+                                              <p:pRg st="0" end="0"/>
+                                            </p:txEl>
+                                          </p:spTgt>
+                                        </p:tgtEl>
+                                        <p:attrNameLst>
+                                          <p:attrName>ppt_y</p:attrName>
+                                        </p:attrNameLst>
+                                      </p:cBhvr>
+                                      <p:tavLst>
+                                        <p:tav tm="0">
+                                          <p:val>
+                                            <p:strVal val="#ppt_y-.1"/>
+                                          </p:val>
+                                        </p:tav>
+                                        <p:tav tm="100000">
+                                          <p:val>
+                                            <p:strVal val="#ppt_y"/>
+                                          </p:val>
+                                        </p:tav>
+                                      </p:tavLst>
+                                    </p:anim>
+                                  </p:childTnLst>
+                                </p:cTn>
+                              </p:par>
+                            </p:childTnLst>
+                          </p:cTn>
+                        </p:par>
+                      </p:childTnLst>
+                    </p:cTn>
+                  </p:par>
+                  <p:par>
+                    <p:cTn id="10" fill="hold">
+                      <p:stCondLst>
+                        <p:cond delay="indefinite"/>
+                      </p:stCondLst>
+                      <p:childTnLst>
+                        <p:par>
+                          <p:cTn id="11" fill="hold">
+                            <p:stCondLst>
+                              <p:cond delay="0"/>
+                            </p:stCondLst>
+                            <p:childTnLst>
+                              <p:par>
+                                <p:cTn id="12" presetID="42" presetClass="entr" presetSubtype="0" fill="hold" nodeType="clickEffect">
+                                  <p:stCondLst>
+                                    <p:cond delay="0"/>
+                                  </p:stCondLst>
+                                  <p:childTnLst>
+                                    <p:set>
+                                      <p:cBhvr>
+                                        <p:cTn id="13" dur="1" fill="hold">
+                                          <p:stCondLst>
+                                            <p:cond delay="0"/>
+                                          </p:stCondLst>
+                                        </p:cTn>
+                                        <p:tgtEl>
+                                          <p:spTgt spid="7"/>
+                                        </p:tgtEl>
+                                        <p:attrNameLst>
+                                          <p:attrName>style.visibility</p:attrName>
+                                        </p:attrNameLst>
+                                      </p:cBhvr>
+                                      <p:to>
+                                        <p:strVal val="visible"/>
+                                      </p:to>
+                                    </p:set>
+                                    <p:animEffect transition="in" filter="fade">
+                                      <p:cBhvr>
+                                        <p:cTn id="14" dur="1000"/>
+                                        <p:tgtEl>
+                                          <p:spTgt spid="7"/>
+                                        </p:tgtEl>
+                                      </p:cBhvr>
+                                    </p:animEffect>
+                                    <p:anim calcmode="lin" valueType="num">
+                                      <p:cBhvr>
+                                        <p:cTn id="15" dur="1000" fill="hold"/>
+                                        <p:tgtEl>
+                                          <p:spTgt spid="7"/>
+                                        </p:tgtEl>
+                                        <p:attrNameLst>
+                                          <p:attrName>ppt_x</p:attrName>
+                                        </p:attrNameLst>
+                                      </p:cBhvr>
+                                      <p:tavLst>
+                                        <p:tav tm="0">
+                                          <p:val>
+                                            <p:strVal val="#ppt_x"/>
+                                          </p:val>
+                                        </p:tav>
+                                        <p:tav tm="100000">
+                                          <p:val>
+                                            <p:strVal val="#ppt_x"/>
+                                          </p:val>
+                                        </p:tav>
+                                      </p:tavLst>
+                                    </p:anim>
+                                    <p:anim calcmode="lin" valueType="num">
+                                      <p:cBhvr>
+                                        <p:cTn id="16" dur="1000" fill="hold"/>
+                                        <p:tgtEl>
+                                          <p:spTgt spid="7"/>
+                                        </p:tgtEl>
+                                        <p:attrNameLst>
+                                          <p:attrName>ppt_y</p:attrName>
+                                        </p:attrNameLst>
+                                      </p:cBhvr>
+                                      <p:tavLst>
+                                        <p:tav tm="0">
+                                          <p:val>
+                                            <p:strVal val="#ppt_y+.1"/>
+                                          </p:val>
+                                        </p:tav>
+                                        <p:tav tm="100000">
+                                          <p:val>
+                                            <p:strVal val="#ppt_y"/>
+                                          </p:val>
+                                        </p:tav>
+                                      </p:tavLst>
+                                    </p:anim>
+                                  </p:childTnLst>
+                                </p:cTn>
+                              </p:par>
+                            </p:childTnLst>
+                          </p:cTn>
+                        </p:par>
+                      </p:childTnLst>
+                    </p:cTn>
+                  </p:par>
+                  <p:par>
+                    <p:cTn id="17" fill="hold">
+                      <p:stCondLst>
+                        <p:cond delay="indefinite"/>
+                      </p:stCondLst>
+                      <p:childTnLst>
+                        <p:par>
+                          <p:cTn id="18" fill="hold">
+                            <p:stCondLst>
+                              <p:cond delay="0"/>
+                            </p:stCondLst>
+                            <p:childTnLst>
+                              <p:par>
+                                <p:cTn id="19" presetID="47" presetClass="entr" presetSubtype="0" fill="hold" grpId="0" nodeType="clickEffect">
+                                  <p:stCondLst>
+                                    <p:cond delay="0"/>
+                                  </p:stCondLst>
+                                  <p:childTnLst>
+                                    <p:set>
+                                      <p:cBhvr>
+                                        <p:cTn id="20" dur="1" fill="hold">
+                                          <p:stCondLst>
+                                            <p:cond delay="0"/>
+                                          </p:stCondLst>
+                                        </p:cTn>
+                                        <p:tgtEl>
+                                          <p:spTgt spid="3">
+                                            <p:txEl>
+                                              <p:pRg st="6" end="6"/>
+                                            </p:txEl>
+                                          </p:spTgt>
+                                        </p:tgtEl>
+                                        <p:attrNameLst>
+                                          <p:attrName>style.visibility</p:attrName>
+                                        </p:attrNameLst>
+                                      </p:cBhvr>
+                                      <p:to>
+                                        <p:strVal val="visible"/>
+                                      </p:to>
+                                    </p:set>
+                                    <p:animEffect transition="in" filter="fade">
+                                      <p:cBhvr>
+                                        <p:cTn id="21" dur="1000"/>
+                                        <p:tgtEl>
+                                          <p:spTgt spid="3">
+                                            <p:txEl>
+                                              <p:pRg st="6" end="6"/>
+                                            </p:txEl>
+                                          </p:spTgt>
+                                        </p:tgtEl>
+                                      </p:cBhvr>
+                                    </p:animEffect>
+                                    <p:anim calcmode="lin" valueType="num">
+                                      <p:cBhvr>
+                                        <p:cTn id="22" dur="1000" fill="hold"/>
+                                        <p:tgtEl>
+                                          <p:spTgt spid="3">
+                                            <p:txEl>
+                                              <p:pRg st="6" end="6"/>
+                                            </p:txEl>
+                                          </p:spTgt>
+                                        </p:tgtEl>
+                                        <p:attrNameLst>
+                                          <p:attrName>ppt_x</p:attrName>
+                                        </p:attrNameLst>
+                                      </p:cBhvr>
+                                      <p:tavLst>
+                                        <p:tav tm="0">
+                                          <p:val>
+                                            <p:strVal val="#ppt_x"/>
+                                          </p:val>
+                                        </p:tav>
+                                        <p:tav tm="100000">
+                                          <p:val>
+                                            <p:strVal val="#ppt_x"/>
+                                          </p:val>
+                                        </p:tav>
+                                      </p:tavLst>
+                                    </p:anim>
+                                    <p:anim calcmode="lin" valueType="num">
+                                      <p:cBhvr>
+                                        <p:cTn id="23" dur="1000" fill="hold"/>
+                                        <p:tgtEl>
+                                          <p:spTgt spid="3">
+                                            <p:txEl>
+                                              <p:pRg st="6" end="6"/>
+                                            </p:txEl>
+                                          </p:spTgt>
+                                        </p:tgtEl>
+                                        <p:attrNameLst>
+                                          <p:attrName>ppt_y</p:attrName>
+                                        </p:attrNameLst>
+                                      </p:cBhvr>
+                                      <p:tavLst>
+                                        <p:tav tm="0">
+                                          <p:val>
+                                            <p:strVal val="#ppt_y-.1"/>
+                                          </p:val>
+                                        </p:tav>
+                                        <p:tav tm="100000">
+                                          <p:val>
+                                            <p:strVal val="#ppt_y"/>
+                                          </p:val>
+                                        </p:tav>
+                                      </p:tavLst>
+                                    </p:anim>
+                                  </p:childTnLst>
+                                </p:cTn>
+                              </p:par>
+                            </p:childTnLst>
+                          </p:cTn>
+                        </p:par>
+                      </p:childTnLst>
+                    </p:cTn>
+                  </p:par>
+                  <p:par>
+                    <p:cTn id="24" fill="hold">
+                      <p:stCondLst>
+                        <p:cond delay="indefinite"/>
+                      </p:stCondLst>
+                      <p:childTnLst>
+                        <p:par>
+                          <p:cTn id="25" fill="hold">
+                            <p:stCondLst>
+                              <p:cond delay="0"/>
+                            </p:stCondLst>
+                            <p:childTnLst>
+                              <p:par>
+                                <p:cTn id="26" presetID="42" presetClass="entr" presetSubtype="0" fill="hold" nodeType="clickEffect">
+                                  <p:stCondLst>
+                                    <p:cond delay="0"/>
+                                  </p:stCondLst>
+                                  <p:childTnLst>
+                                    <p:set>
+                                      <p:cBhvr>
+                                        <p:cTn id="27" dur="1" fill="hold">
+                                          <p:stCondLst>
+                                            <p:cond delay="0"/>
+                                          </p:stCondLst>
+                                        </p:cTn>
+                                        <p:tgtEl>
+                                          <p:spTgt spid="8"/>
+                                        </p:tgtEl>
+                                        <p:attrNameLst>
+                                          <p:attrName>style.visibility</p:attrName>
+                                        </p:attrNameLst>
+                                      </p:cBhvr>
+                                      <p:to>
+                                        <p:strVal val="visible"/>
+                                      </p:to>
+                                    </p:set>
+                                    <p:animEffect transition="in" filter="fade">
+                                      <p:cBhvr>
+                                        <p:cTn id="28" dur="1000"/>
+                                        <p:tgtEl>
+                                          <p:spTgt spid="8"/>
+                                        </p:tgtEl>
+                                      </p:cBhvr>
+                                    </p:animEffect>
+                                    <p:anim calcmode="lin" valueType="num">
+                                      <p:cBhvr>
+                                        <p:cTn id="29" dur="1000" fill="hold"/>
+                                        <p:tgtEl>
+                                          <p:spTgt spid="8"/>
+                                        </p:tgtEl>
+                                        <p:attrNameLst>
+                                          <p:attrName>ppt_x</p:attrName>
+                                        </p:attrNameLst>
+                                      </p:cBhvr>
+                                      <p:tavLst>
+                                        <p:tav tm="0">
+                                          <p:val>
+                                            <p:strVal val="#ppt_x"/>
+                                          </p:val>
+                                        </p:tav>
+                                        <p:tav tm="100000">
+                                          <p:val>
+                                            <p:strVal val="#ppt_x"/>
+                                          </p:val>
+                                        </p:tav>
+                                      </p:tavLst>
+                                    </p:anim>
+                                    <p:anim calcmode="lin" valueType="num">
+                                      <p:cBhvr>
+                                        <p:cTn id="30" dur="1000" fill="hold"/>
+                                        <p:tgtEl>
+                                          <p:spTgt spid="8"/>
+                                        </p:tgtEl>
+                                        <p:attrNameLst>
+                                          <p:attrName>ppt_y</p:attrName>
+                                        </p:attrNameLst>
+                                      </p:cBhvr>
+                                      <p:tavLst>
+                                        <p:tav tm="0">
+                                          <p:val>
+                                            <p:strVal val="#ppt_y+.1"/>
+                                          </p:val>
+                                        </p:tav>
+                                        <p:tav tm="100000">
+                                          <p:val>
+                                            <p:strVal val="#ppt_y"/>
+                                          </p:val>
+                                        </p:tav>
+                                      </p:tavLst>
+                                    </p:anim>
+                                  </p:childTnLst>
+                                </p:cTn>
+                              </p:par>
+                            </p:childTnLst>
+                          </p:cTn>
+                        </p:par>
+                      </p:childTnLst>
+                    </p:cTn>
+                  </p:par>
+                </p:childTnLst>
+              </p:cTn>
+              <p:prevCondLst>
+                <p:cond evt="onPrev" delay="0">
+                  <p:tgtEl>
+                    <p:sldTgt/>
+                  </p:tgtEl>
+                </p:cond>
+              </p:prevCondLst>
+              <p:nextCondLst>
+                <p:cond evt="onNext" delay="0">
+                  <p:tgtEl>
+                    <p:sldTgt/>
+                  </p:tgtEl>
+                </p:cond>
+              </p:nextCondLst>
+            </p:seq>
+          </p:childTnLst>
+        </p:cTn>
+      </p:par>
+    </p:tnLst>
+    <p:bldLst>
+      <p:bldP spid="3" grpId="0" uiExpand="1" build="p"/>
+    </p:bldLst>
+  </p:timing>
+</p:sld>
+</file>
+
+<file path=ppt/slides/slide17.xml><?xml version="1.0" encoding="utf-8"?>
+<p:sld xmlns:a="http://schemas.openxmlformats.org/drawingml/2006/main" xmlns:r="http://schemas.openxmlformats.org/officeDocument/2006/relationships" xmlns:p="http://schemas.openxmlformats.org/presentationml/2006/main">
+  <p:cSld>
+    <p:spTree>
+      <p:nvGrpSpPr>
+        <p:cNvPr id="1" name=""/>
+        <p:cNvGrpSpPr/>
+        <p:nvPr/>
+      </p:nvGrpSpPr>
+      <p:grpSpPr>
+        <a:xfrm>
+          <a:off x="0" y="0"/>
+          <a:ext cx="0" cy="0"/>
+          <a:chOff x="0" y="0"/>
+          <a:chExt cx="0" cy="0"/>
+        </a:xfrm>
+      </p:grpSpPr>
+      <p:sp>
+        <p:nvSpPr>
+          <p:cNvPr id="2" name="Заголовок 1"/>
+          <p:cNvSpPr>
+            <a:spLocks noGrp="1"/>
+          </p:cNvSpPr>
+          <p:nvPr>
+            <p:ph type="title"/>
+          </p:nvPr>
+        </p:nvSpPr>
+        <p:spPr/>
+        <p:txBody>
+          <a:bodyPr/>
+          <a:lstStyle/>
+          <a:p>
+            <a:r>
+              <a:rPr lang="en-US" dirty="0"/>
+              <a:t>C# </a:t>
+            </a:r>
+            <a:r>
+              <a:rPr lang="en-US" dirty="0" smtClean="0"/>
+              <a:t>basics</a:t>
+            </a:r>
+            <a:br>
+              <a:rPr lang="en-US" dirty="0" smtClean="0"/>
+            </a:br>
+            <a:r>
+              <a:rPr lang="en-US" sz="2400" dirty="0" smtClean="0">
+                <a:solidFill>
+                  <a:prstClr val="white">
+                    <a:lumMod val="50000"/>
+                  </a:prstClr>
+                </a:solidFill>
+              </a:rPr>
+              <a:t>Conditional statements</a:t>
+            </a:r>
+            <a:endParaRPr lang="en-US" dirty="0"/>
+          </a:p>
+        </p:txBody>
+      </p:sp>
+      <p:sp>
+        <p:nvSpPr>
+          <p:cNvPr id="4" name="Дата 3"/>
+          <p:cNvSpPr>
+            <a:spLocks noGrp="1"/>
+          </p:cNvSpPr>
+          <p:nvPr>
+            <p:ph type="dt" sz="half" idx="10"/>
+          </p:nvPr>
+        </p:nvSpPr>
+        <p:spPr>
+          <a:xfrm>
+            <a:off x="6598153" y="6041362"/>
+            <a:ext cx="1518920" cy="365125"/>
+          </a:xfrm>
+        </p:spPr>
+        <p:txBody>
+          <a:bodyPr/>
+          <a:lstStyle/>
+          <a:p>
+            <a:fld id="{939306D3-16AC-481B-963B-74A1D01AC013}" type="datetime3">
+              <a:rPr lang="en-US" sz="1100" smtClean="0"/>
+              <a:t>30 September 2021</a:t>
+            </a:fld>
+            <a:endParaRPr lang="en-US" sz="1100" dirty="0"/>
+          </a:p>
+        </p:txBody>
+      </p:sp>
+      <p:sp>
+        <p:nvSpPr>
+          <p:cNvPr id="5" name="Нижний колонтитул 4"/>
+          <p:cNvSpPr>
+            <a:spLocks noGrp="1"/>
+          </p:cNvSpPr>
+          <p:nvPr>
+            <p:ph type="ftr" sz="quarter" idx="11"/>
+          </p:nvPr>
+        </p:nvSpPr>
+        <p:spPr/>
+        <p:txBody>
+          <a:bodyPr/>
+          <a:lstStyle/>
+          <a:p>
+            <a:r>
+              <a:rPr lang="en-US" sz="1100" dirty="0" smtClean="0"/>
+              <a:t>Automated framework with C#</a:t>
+            </a:r>
+          </a:p>
+          <a:p>
+            <a:r>
+              <a:rPr lang="en-US" sz="1100" dirty="0"/>
+              <a:t>Yury </a:t>
+            </a:r>
+            <a:r>
+              <a:rPr lang="en-US" sz="1100" dirty="0" smtClean="0"/>
+              <a:t>Alifanov</a:t>
+            </a:r>
+            <a:endParaRPr lang="en-US" sz="1100" dirty="0"/>
+          </a:p>
+        </p:txBody>
+      </p:sp>
+      <p:sp>
+        <p:nvSpPr>
+          <p:cNvPr id="6" name="Номер слайда 5"/>
+          <p:cNvSpPr>
+            <a:spLocks noGrp="1"/>
+          </p:cNvSpPr>
+          <p:nvPr>
+            <p:ph type="sldNum" sz="quarter" idx="12"/>
+          </p:nvPr>
+        </p:nvSpPr>
+        <p:spPr/>
+        <p:txBody>
+          <a:bodyPr/>
+          <a:lstStyle/>
+          <a:p>
+            <a:fld id="{519954A3-9DFD-4C44-94BA-B95130A3BA1C}" type="slidenum">
+              <a:rPr lang="en-US" sz="1100" smtClean="0"/>
+              <a:t>17</a:t>
+            </a:fld>
+            <a:endParaRPr lang="en-US" sz="1100" dirty="0"/>
+          </a:p>
+        </p:txBody>
+      </p:sp>
+      <p:sp>
+        <p:nvSpPr>
+          <p:cNvPr id="3" name="Объект 2"/>
+          <p:cNvSpPr>
+            <a:spLocks noGrp="1"/>
+          </p:cNvSpPr>
+          <p:nvPr>
+            <p:ph idx="1"/>
+          </p:nvPr>
+        </p:nvSpPr>
+        <p:spPr>
+          <a:xfrm>
+            <a:off x="735146" y="1777549"/>
+            <a:ext cx="8596668" cy="3880773"/>
+          </a:xfrm>
+        </p:spPr>
+        <p:txBody>
+          <a:bodyPr/>
+          <a:lstStyle/>
+          <a:p>
+            <a:pPr marL="0" indent="0">
+              <a:buNone/>
+            </a:pPr>
+            <a:endParaRPr lang="en-US" dirty="0" smtClean="0"/>
+          </a:p>
+          <a:p>
+            <a:pPr marL="0" indent="0">
+              <a:buNone/>
+            </a:pPr>
+            <a:endParaRPr lang="en-US" dirty="0"/>
+          </a:p>
+          <a:p>
+            <a:pPr marL="0" indent="0">
+              <a:buNone/>
+            </a:pPr>
+            <a:endParaRPr lang="en-US" dirty="0"/>
+          </a:p>
+        </p:txBody>
+      </p:sp>
+      <p:sp>
+        <p:nvSpPr>
+          <p:cNvPr id="8" name="TextBox 7"/>
+          <p:cNvSpPr txBox="1"/>
+          <p:nvPr/>
+        </p:nvSpPr>
+        <p:spPr>
+          <a:xfrm>
+            <a:off x="2516142" y="1930400"/>
+            <a:ext cx="1843087" cy="2308324"/>
+          </a:xfrm>
+          <a:prstGeom prst="rect">
+            <a:avLst/>
+          </a:prstGeom>
+          <a:noFill/>
+        </p:spPr>
+        <p:txBody>
+          <a:bodyPr wrap="square" rtlCol="0">
+            <a:spAutoFit/>
+          </a:bodyPr>
+          <a:lstStyle/>
+          <a:p>
+            <a:r>
+              <a:rPr lang="en-US" dirty="0" smtClean="0">
+                <a:solidFill>
+                  <a:schemeClr val="accent2"/>
+                </a:solidFill>
+                <a:latin typeface="Consolas" panose="020B0609020204030204" pitchFamily="49" charset="0"/>
+              </a:rPr>
+              <a:t>if</a:t>
+            </a:r>
+            <a:r>
+              <a:rPr lang="en-US" dirty="0" smtClean="0">
+                <a:latin typeface="Consolas" panose="020B0609020204030204" pitchFamily="49" charset="0"/>
+              </a:rPr>
+              <a:t>(condition)</a:t>
+            </a:r>
+          </a:p>
+          <a:p>
+            <a:r>
+              <a:rPr lang="en-US" dirty="0" smtClean="0">
+                <a:latin typeface="Consolas" panose="020B0609020204030204" pitchFamily="49" charset="0"/>
+              </a:rPr>
+              <a:t>{</a:t>
+            </a:r>
+          </a:p>
+          <a:p>
+            <a:r>
+              <a:rPr lang="en-US" dirty="0">
+                <a:latin typeface="Consolas" panose="020B0609020204030204" pitchFamily="49" charset="0"/>
+              </a:rPr>
+              <a:t>	</a:t>
+            </a:r>
+            <a:r>
+              <a:rPr lang="en-US" dirty="0" smtClean="0">
+                <a:latin typeface="Consolas" panose="020B0609020204030204" pitchFamily="49" charset="0"/>
+              </a:rPr>
+              <a:t>body;</a:t>
+            </a:r>
+          </a:p>
+          <a:p>
+            <a:r>
+              <a:rPr lang="en-US" dirty="0" smtClean="0">
+                <a:latin typeface="Consolas" panose="020B0609020204030204" pitchFamily="49" charset="0"/>
+              </a:rPr>
+              <a:t>}</a:t>
+            </a:r>
+          </a:p>
+          <a:p>
+            <a:r>
+              <a:rPr lang="en-US" dirty="0" smtClean="0">
+                <a:solidFill>
+                  <a:schemeClr val="accent2"/>
+                </a:solidFill>
+                <a:latin typeface="Consolas" panose="020B0609020204030204" pitchFamily="49" charset="0"/>
+              </a:rPr>
+              <a:t>else</a:t>
+            </a:r>
+          </a:p>
+          <a:p>
+            <a:r>
+              <a:rPr lang="en-US" dirty="0" smtClean="0">
+                <a:latin typeface="Consolas" panose="020B0609020204030204" pitchFamily="49" charset="0"/>
+              </a:rPr>
+              <a:t>{</a:t>
+            </a:r>
+          </a:p>
+          <a:p>
+            <a:r>
+              <a:rPr lang="en-US" dirty="0">
+                <a:latin typeface="Consolas" panose="020B0609020204030204" pitchFamily="49" charset="0"/>
+              </a:rPr>
+              <a:t>	</a:t>
+            </a:r>
+            <a:r>
+              <a:rPr lang="en-US" dirty="0" smtClean="0">
+                <a:latin typeface="Consolas" panose="020B0609020204030204" pitchFamily="49" charset="0"/>
+              </a:rPr>
+              <a:t>body;</a:t>
+            </a:r>
+          </a:p>
+          <a:p>
+            <a:r>
+              <a:rPr lang="en-US" dirty="0" smtClean="0">
+                <a:latin typeface="Consolas" panose="020B0609020204030204" pitchFamily="49" charset="0"/>
+              </a:rPr>
+              <a:t>}</a:t>
+            </a:r>
+            <a:endParaRPr lang="en-US" dirty="0">
+              <a:latin typeface="Consolas" panose="020B0609020204030204" pitchFamily="49" charset="0"/>
+            </a:endParaRPr>
+          </a:p>
+        </p:txBody>
+      </p:sp>
+      <p:sp>
+        <p:nvSpPr>
+          <p:cNvPr id="9" name="TextBox 8"/>
+          <p:cNvSpPr txBox="1"/>
+          <p:nvPr/>
+        </p:nvSpPr>
+        <p:spPr>
+          <a:xfrm>
+            <a:off x="677334" y="1906752"/>
+            <a:ext cx="1843087" cy="1200329"/>
+          </a:xfrm>
+          <a:prstGeom prst="rect">
+            <a:avLst/>
+          </a:prstGeom>
+          <a:noFill/>
+        </p:spPr>
+        <p:txBody>
+          <a:bodyPr wrap="square" rtlCol="0">
+            <a:spAutoFit/>
+          </a:bodyPr>
+          <a:lstStyle/>
+          <a:p>
+            <a:r>
+              <a:rPr lang="en-US" dirty="0" smtClean="0">
+                <a:solidFill>
+                  <a:schemeClr val="accent2"/>
+                </a:solidFill>
+                <a:latin typeface="Consolas" panose="020B0609020204030204" pitchFamily="49" charset="0"/>
+              </a:rPr>
+              <a:t>if</a:t>
+            </a:r>
+            <a:r>
+              <a:rPr lang="en-US" dirty="0" smtClean="0">
+                <a:latin typeface="Consolas" panose="020B0609020204030204" pitchFamily="49" charset="0"/>
+              </a:rPr>
+              <a:t>(condition)</a:t>
+            </a:r>
+          </a:p>
+          <a:p>
+            <a:r>
+              <a:rPr lang="en-US" dirty="0" smtClean="0">
+                <a:latin typeface="Consolas" panose="020B0609020204030204" pitchFamily="49" charset="0"/>
+              </a:rPr>
+              <a:t>{</a:t>
+            </a:r>
+          </a:p>
+          <a:p>
+            <a:r>
+              <a:rPr lang="en-US" dirty="0">
+                <a:latin typeface="Consolas" panose="020B0609020204030204" pitchFamily="49" charset="0"/>
+              </a:rPr>
+              <a:t>	</a:t>
+            </a:r>
+            <a:r>
+              <a:rPr lang="en-US" dirty="0" smtClean="0">
+                <a:latin typeface="Consolas" panose="020B0609020204030204" pitchFamily="49" charset="0"/>
+              </a:rPr>
+              <a:t>body;</a:t>
+            </a:r>
+          </a:p>
+          <a:p>
+            <a:r>
+              <a:rPr lang="en-US" dirty="0" smtClean="0">
+                <a:latin typeface="Consolas" panose="020B0609020204030204" pitchFamily="49" charset="0"/>
+              </a:rPr>
+              <a:t>}</a:t>
+            </a:r>
+          </a:p>
+        </p:txBody>
+      </p:sp>
+      <p:sp>
+        <p:nvSpPr>
+          <p:cNvPr id="10" name="TextBox 9"/>
+          <p:cNvSpPr txBox="1"/>
+          <p:nvPr/>
+        </p:nvSpPr>
+        <p:spPr>
+          <a:xfrm>
+            <a:off x="4359228" y="1903659"/>
+            <a:ext cx="3757845" cy="3416320"/>
+          </a:xfrm>
+          <a:prstGeom prst="rect">
+            <a:avLst/>
+          </a:prstGeom>
+          <a:noFill/>
+        </p:spPr>
+        <p:txBody>
+          <a:bodyPr wrap="square" rtlCol="0">
+            <a:spAutoFit/>
+          </a:bodyPr>
+          <a:lstStyle/>
+          <a:p>
+            <a:r>
+              <a:rPr lang="en-US" dirty="0" smtClean="0">
+                <a:solidFill>
+                  <a:schemeClr val="accent2"/>
+                </a:solidFill>
+                <a:latin typeface="Consolas" panose="020B0609020204030204" pitchFamily="49" charset="0"/>
+              </a:rPr>
+              <a:t>if</a:t>
+            </a:r>
+            <a:r>
+              <a:rPr lang="en-US" dirty="0" smtClean="0">
+                <a:latin typeface="Consolas" panose="020B0609020204030204" pitchFamily="49" charset="0"/>
+              </a:rPr>
+              <a:t>(first-condition)</a:t>
+            </a:r>
+          </a:p>
+          <a:p>
+            <a:r>
+              <a:rPr lang="en-US" dirty="0" smtClean="0">
+                <a:latin typeface="Consolas" panose="020B0609020204030204" pitchFamily="49" charset="0"/>
+              </a:rPr>
+              <a:t>{</a:t>
+            </a:r>
+          </a:p>
+          <a:p>
+            <a:r>
+              <a:rPr lang="en-US" dirty="0">
+                <a:latin typeface="Consolas" panose="020B0609020204030204" pitchFamily="49" charset="0"/>
+              </a:rPr>
+              <a:t>	</a:t>
+            </a:r>
+            <a:r>
+              <a:rPr lang="en-US" dirty="0" smtClean="0">
+                <a:latin typeface="Consolas" panose="020B0609020204030204" pitchFamily="49" charset="0"/>
+              </a:rPr>
+              <a:t>body;</a:t>
+            </a:r>
+          </a:p>
+          <a:p>
+            <a:r>
+              <a:rPr lang="en-US" dirty="0" smtClean="0">
+                <a:latin typeface="Consolas" panose="020B0609020204030204" pitchFamily="49" charset="0"/>
+              </a:rPr>
+              <a:t>}</a:t>
+            </a:r>
+          </a:p>
+          <a:p>
+            <a:r>
+              <a:rPr lang="en-US" dirty="0" smtClean="0">
+                <a:solidFill>
+                  <a:schemeClr val="accent2"/>
+                </a:solidFill>
+                <a:latin typeface="Consolas" panose="020B0609020204030204" pitchFamily="49" charset="0"/>
+              </a:rPr>
+              <a:t>else if</a:t>
+            </a:r>
+            <a:r>
+              <a:rPr lang="en-US" dirty="0" smtClean="0">
+                <a:latin typeface="Consolas" panose="020B0609020204030204" pitchFamily="49" charset="0"/>
+              </a:rPr>
+              <a:t>(second-condition)</a:t>
+            </a:r>
+          </a:p>
+          <a:p>
+            <a:r>
+              <a:rPr lang="en-US" dirty="0" smtClean="0">
+                <a:latin typeface="Consolas" panose="020B0609020204030204" pitchFamily="49" charset="0"/>
+              </a:rPr>
+              <a:t>{</a:t>
+            </a:r>
+          </a:p>
+          <a:p>
+            <a:r>
+              <a:rPr lang="en-US" dirty="0">
+                <a:latin typeface="Consolas" panose="020B0609020204030204" pitchFamily="49" charset="0"/>
+              </a:rPr>
+              <a:t>	</a:t>
+            </a:r>
+            <a:r>
+              <a:rPr lang="en-US" dirty="0" smtClean="0">
+                <a:latin typeface="Consolas" panose="020B0609020204030204" pitchFamily="49" charset="0"/>
+              </a:rPr>
+              <a:t>body;</a:t>
+            </a:r>
+          </a:p>
+          <a:p>
+            <a:r>
+              <a:rPr lang="en-US" dirty="0">
+                <a:latin typeface="Consolas" panose="020B0609020204030204" pitchFamily="49" charset="0"/>
+              </a:rPr>
+              <a:t>}</a:t>
+            </a:r>
+            <a:endParaRPr lang="en-US" dirty="0" smtClean="0">
+              <a:latin typeface="Consolas" panose="020B0609020204030204" pitchFamily="49" charset="0"/>
+            </a:endParaRPr>
+          </a:p>
+          <a:p>
+            <a:r>
+              <a:rPr lang="en-US" dirty="0" smtClean="0">
+                <a:solidFill>
+                  <a:schemeClr val="accent2"/>
+                </a:solidFill>
+                <a:latin typeface="Consolas" panose="020B0609020204030204" pitchFamily="49" charset="0"/>
+              </a:rPr>
+              <a:t>else</a:t>
+            </a:r>
+          </a:p>
+          <a:p>
+            <a:r>
+              <a:rPr lang="en-US" dirty="0" smtClean="0">
+                <a:latin typeface="Consolas" panose="020B0609020204030204" pitchFamily="49" charset="0"/>
+              </a:rPr>
+              <a:t>{</a:t>
+            </a:r>
+          </a:p>
+          <a:p>
+            <a:r>
+              <a:rPr lang="en-US" dirty="0">
+                <a:latin typeface="Consolas" panose="020B0609020204030204" pitchFamily="49" charset="0"/>
+              </a:rPr>
+              <a:t>	</a:t>
+            </a:r>
+            <a:r>
+              <a:rPr lang="en-US" dirty="0" smtClean="0">
+                <a:latin typeface="Consolas" panose="020B0609020204030204" pitchFamily="49" charset="0"/>
+              </a:rPr>
+              <a:t>body;</a:t>
+            </a:r>
+          </a:p>
+          <a:p>
+            <a:r>
+              <a:rPr lang="en-US" dirty="0" smtClean="0">
+                <a:latin typeface="Consolas" panose="020B0609020204030204" pitchFamily="49" charset="0"/>
+              </a:rPr>
+              <a:t>}</a:t>
+            </a:r>
+            <a:endParaRPr lang="en-US" dirty="0">
+              <a:latin typeface="Consolas" panose="020B0609020204030204" pitchFamily="49" charset="0"/>
+            </a:endParaRPr>
+          </a:p>
+        </p:txBody>
+      </p:sp>
+      <p:sp>
+        <p:nvSpPr>
+          <p:cNvPr id="12" name="TextBox 11"/>
+          <p:cNvSpPr txBox="1"/>
+          <p:nvPr/>
+        </p:nvSpPr>
+        <p:spPr>
+          <a:xfrm>
+            <a:off x="7983311" y="1871275"/>
+            <a:ext cx="2914650" cy="3693319"/>
+          </a:xfrm>
+          <a:prstGeom prst="rect">
+            <a:avLst/>
+          </a:prstGeom>
+          <a:noFill/>
+        </p:spPr>
+        <p:txBody>
+          <a:bodyPr wrap="square" rtlCol="0">
+            <a:spAutoFit/>
+          </a:bodyPr>
+          <a:lstStyle/>
+          <a:p>
+            <a:r>
+              <a:rPr lang="en-US" dirty="0" smtClean="0">
+                <a:solidFill>
+                  <a:schemeClr val="accent2"/>
+                </a:solidFill>
+                <a:latin typeface="Consolas" panose="020B0609020204030204" pitchFamily="49" charset="0"/>
+              </a:rPr>
+              <a:t>switch</a:t>
+            </a:r>
+            <a:r>
+              <a:rPr lang="en-US" dirty="0" smtClean="0">
+                <a:latin typeface="Consolas" panose="020B0609020204030204" pitchFamily="49" charset="0"/>
+              </a:rPr>
+              <a:t>(value)</a:t>
+            </a:r>
+          </a:p>
+          <a:p>
+            <a:r>
+              <a:rPr lang="en-US" dirty="0" smtClean="0">
+                <a:latin typeface="Consolas" panose="020B0609020204030204" pitchFamily="49" charset="0"/>
+              </a:rPr>
+              <a:t>{</a:t>
+            </a:r>
+          </a:p>
+          <a:p>
+            <a:r>
+              <a:rPr lang="en-US" dirty="0" smtClean="0">
+                <a:solidFill>
+                  <a:schemeClr val="accent2"/>
+                </a:solidFill>
+                <a:latin typeface="Consolas" panose="020B0609020204030204" pitchFamily="49" charset="0"/>
+              </a:rPr>
+              <a:t>	case </a:t>
+            </a:r>
+            <a:r>
+              <a:rPr lang="en-US" dirty="0" smtClean="0">
+                <a:latin typeface="Consolas" panose="020B0609020204030204" pitchFamily="49" charset="0"/>
+              </a:rPr>
+              <a:t>value_1:</a:t>
+            </a:r>
+          </a:p>
+          <a:p>
+            <a:r>
+              <a:rPr lang="en-US" dirty="0">
+                <a:latin typeface="Consolas" panose="020B0609020204030204" pitchFamily="49" charset="0"/>
+              </a:rPr>
+              <a:t>	</a:t>
+            </a:r>
+            <a:r>
+              <a:rPr lang="en-US" dirty="0" smtClean="0">
+                <a:latin typeface="Consolas" panose="020B0609020204030204" pitchFamily="49" charset="0"/>
+              </a:rPr>
+              <a:t>	body;</a:t>
+            </a:r>
+          </a:p>
+          <a:p>
+            <a:r>
+              <a:rPr lang="en-US" dirty="0" smtClean="0">
+                <a:solidFill>
+                  <a:schemeClr val="accent2"/>
+                </a:solidFill>
+                <a:latin typeface="Consolas" panose="020B0609020204030204" pitchFamily="49" charset="0"/>
+              </a:rPr>
+              <a:t>		break</a:t>
+            </a:r>
+            <a:r>
+              <a:rPr lang="en-US" dirty="0" smtClean="0">
+                <a:latin typeface="Consolas" panose="020B0609020204030204" pitchFamily="49" charset="0"/>
+              </a:rPr>
+              <a:t>;</a:t>
+            </a:r>
+          </a:p>
+          <a:p>
+            <a:r>
+              <a:rPr lang="en-US" dirty="0">
+                <a:latin typeface="Consolas" panose="020B0609020204030204" pitchFamily="49" charset="0"/>
+              </a:rPr>
+              <a:t>	</a:t>
+            </a:r>
+            <a:r>
+              <a:rPr lang="en-US" dirty="0">
+                <a:solidFill>
+                  <a:schemeClr val="accent2"/>
+                </a:solidFill>
+                <a:latin typeface="Consolas" panose="020B0609020204030204" pitchFamily="49" charset="0"/>
+              </a:rPr>
+              <a:t>case </a:t>
+            </a:r>
+            <a:r>
+              <a:rPr lang="en-US" dirty="0" smtClean="0">
+                <a:latin typeface="Consolas" panose="020B0609020204030204" pitchFamily="49" charset="0"/>
+              </a:rPr>
+              <a:t>value_2:</a:t>
+            </a:r>
+            <a:endParaRPr lang="en-US" dirty="0">
+              <a:latin typeface="Consolas" panose="020B0609020204030204" pitchFamily="49" charset="0"/>
+            </a:endParaRPr>
+          </a:p>
+          <a:p>
+            <a:r>
+              <a:rPr lang="en-US" dirty="0">
+                <a:latin typeface="Consolas" panose="020B0609020204030204" pitchFamily="49" charset="0"/>
+              </a:rPr>
+              <a:t>		body;</a:t>
+            </a:r>
+          </a:p>
+          <a:p>
+            <a:r>
+              <a:rPr lang="en-US" dirty="0">
+                <a:solidFill>
+                  <a:schemeClr val="accent2"/>
+                </a:solidFill>
+                <a:latin typeface="Consolas" panose="020B0609020204030204" pitchFamily="49" charset="0"/>
+              </a:rPr>
+              <a:t>		break</a:t>
+            </a:r>
+            <a:r>
+              <a:rPr lang="en-US" dirty="0" smtClean="0">
+                <a:latin typeface="Consolas" panose="020B0609020204030204" pitchFamily="49" charset="0"/>
+              </a:rPr>
+              <a:t>;</a:t>
+            </a:r>
+          </a:p>
+          <a:p>
+            <a:r>
+              <a:rPr lang="en-US" dirty="0">
+                <a:latin typeface="Consolas" panose="020B0609020204030204" pitchFamily="49" charset="0"/>
+              </a:rPr>
+              <a:t>	</a:t>
+            </a:r>
+            <a:r>
+              <a:rPr lang="en-US" dirty="0" smtClean="0">
+                <a:solidFill>
+                  <a:schemeClr val="accent5">
+                    <a:lumMod val="75000"/>
+                  </a:schemeClr>
+                </a:solidFill>
+                <a:latin typeface="Consolas" panose="020B0609020204030204" pitchFamily="49" charset="0"/>
+              </a:rPr>
+              <a:t>// …</a:t>
+            </a:r>
+          </a:p>
+          <a:p>
+            <a:r>
+              <a:rPr lang="en-US" dirty="0">
+                <a:solidFill>
+                  <a:schemeClr val="accent5">
+                    <a:lumMod val="75000"/>
+                  </a:schemeClr>
+                </a:solidFill>
+                <a:latin typeface="Consolas" panose="020B0609020204030204" pitchFamily="49" charset="0"/>
+              </a:rPr>
+              <a:t>	</a:t>
+            </a:r>
+            <a:r>
+              <a:rPr lang="en-US" dirty="0">
+                <a:solidFill>
+                  <a:schemeClr val="accent2"/>
+                </a:solidFill>
+                <a:latin typeface="Consolas" panose="020B0609020204030204" pitchFamily="49" charset="0"/>
+              </a:rPr>
+              <a:t> </a:t>
+            </a:r>
+            <a:r>
+              <a:rPr lang="en-US" dirty="0" smtClean="0">
+                <a:solidFill>
+                  <a:schemeClr val="accent2"/>
+                </a:solidFill>
+                <a:latin typeface="Consolas" panose="020B0609020204030204" pitchFamily="49" charset="0"/>
+              </a:rPr>
+              <a:t>default</a:t>
+            </a:r>
+            <a:r>
+              <a:rPr lang="en-US" dirty="0" smtClean="0">
+                <a:latin typeface="Consolas" panose="020B0609020204030204" pitchFamily="49" charset="0"/>
+              </a:rPr>
+              <a:t>:</a:t>
+            </a:r>
+            <a:endParaRPr lang="en-US" dirty="0">
+              <a:latin typeface="Consolas" panose="020B0609020204030204" pitchFamily="49" charset="0"/>
+            </a:endParaRPr>
+          </a:p>
+          <a:p>
+            <a:r>
+              <a:rPr lang="en-US" dirty="0">
+                <a:latin typeface="Consolas" panose="020B0609020204030204" pitchFamily="49" charset="0"/>
+              </a:rPr>
+              <a:t>		body;</a:t>
+            </a:r>
+          </a:p>
+          <a:p>
+            <a:r>
+              <a:rPr lang="en-US" dirty="0">
+                <a:solidFill>
+                  <a:schemeClr val="accent2"/>
+                </a:solidFill>
+                <a:latin typeface="Consolas" panose="020B0609020204030204" pitchFamily="49" charset="0"/>
+              </a:rPr>
+              <a:t>		break</a:t>
+            </a:r>
+            <a:r>
+              <a:rPr lang="en-US" dirty="0">
+                <a:latin typeface="Consolas" panose="020B0609020204030204" pitchFamily="49" charset="0"/>
+              </a:rPr>
+              <a:t>;</a:t>
+            </a:r>
+            <a:endParaRPr lang="en-US" dirty="0">
+              <a:solidFill>
+                <a:schemeClr val="accent5">
+                  <a:lumMod val="75000"/>
+                </a:schemeClr>
+              </a:solidFill>
+              <a:latin typeface="Consolas" panose="020B0609020204030204" pitchFamily="49" charset="0"/>
+            </a:endParaRPr>
+          </a:p>
+          <a:p>
+            <a:r>
+              <a:rPr lang="en-US" dirty="0" smtClean="0">
+                <a:latin typeface="Consolas" panose="020B0609020204030204" pitchFamily="49" charset="0"/>
+              </a:rPr>
+              <a:t>}</a:t>
+            </a:r>
+            <a:endParaRPr lang="en-US" dirty="0">
+              <a:latin typeface="Consolas" panose="020B0609020204030204" pitchFamily="49" charset="0"/>
+            </a:endParaRPr>
+          </a:p>
+        </p:txBody>
+      </p:sp>
+    </p:spTree>
+    <p:extLst>
+      <p:ext uri="{BB962C8B-B14F-4D97-AF65-F5344CB8AC3E}">
+        <p14:creationId xmlns:p14="http://schemas.microsoft.com/office/powerpoint/2010/main" val="2027248920"/>
+      </p:ext>
+    </p:extLst>
+  </p:cSld>
+  <p:clrMapOvr>
+    <a:masterClrMapping/>
+  </p:clrMapOvr>
+  <p:timing>
+    <p:tnLst>
+      <p:par>
+        <p:cTn id="1" dur="indefinite" restart="never" nodeType="tmRoot">
+          <p:childTnLst>
+            <p:seq concurrent="1" nextAc="seek">
+              <p:cTn id="2" dur="indefinite" nodeType="mainSeq">
+                <p:childTnLst>
+                  <p:par>
+                    <p:cTn id="3" fill="hold">
+                      <p:stCondLst>
+                        <p:cond delay="indefinite"/>
+                      </p:stCondLst>
+                      <p:childTnLst>
+                        <p:par>
+                          <p:cTn id="4" fill="hold">
+                            <p:stCondLst>
+                              <p:cond delay="0"/>
+                            </p:stCondLst>
+                            <p:childTnLst>
+                              <p:par>
+                                <p:cTn id="5" presetID="1" presetClass="entr" presetSubtype="0" fill="hold" grpId="0" nodeType="clickEffect">
+                                  <p:stCondLst>
+                                    <p:cond delay="0"/>
+                                  </p:stCondLst>
+                                  <p:childTnLst>
+                                    <p:set>
+                                      <p:cBhvr>
+                                        <p:cTn id="6" dur="1" fill="hold">
+                                          <p:stCondLst>
+                                            <p:cond delay="0"/>
+                                          </p:stCondLst>
+                                        </p:cTn>
+                                        <p:tgtEl>
+                                          <p:spTgt spid="9"/>
+                                        </p:tgtEl>
+                                        <p:attrNameLst>
+                                          <p:attrName>style.visibility</p:attrName>
+                                        </p:attrNameLst>
+                                      </p:cBhvr>
+                                      <p:to>
+                                        <p:strVal val="visible"/>
+                                      </p:to>
+                                    </p:set>
+                                  </p:childTnLst>
+                                </p:cTn>
+                              </p:par>
+                            </p:childTnLst>
+                          </p:cTn>
+                        </p:par>
+                      </p:childTnLst>
+                    </p:cTn>
+                  </p:par>
+                  <p:par>
+                    <p:cTn id="7" fill="hold">
+                      <p:stCondLst>
+                        <p:cond delay="indefinite"/>
+                      </p:stCondLst>
+                      <p:childTnLst>
+                        <p:par>
+                          <p:cTn id="8" fill="hold">
+                            <p:stCondLst>
+                              <p:cond delay="0"/>
+                            </p:stCondLst>
+                            <p:childTnLst>
+                              <p:par>
+                                <p:cTn id="9" presetID="1" presetClass="entr" presetSubtype="0" fill="hold" grpId="0" nodeType="clickEffect">
+                                  <p:stCondLst>
+                                    <p:cond delay="0"/>
+                                  </p:stCondLst>
+                                  <p:childTnLst>
+                                    <p:set>
+                                      <p:cBhvr>
+                                        <p:cTn id="10" dur="1" fill="hold">
+                                          <p:stCondLst>
+                                            <p:cond delay="0"/>
+                                          </p:stCondLst>
+                                        </p:cTn>
+                                        <p:tgtEl>
+                                          <p:spTgt spid="8"/>
+                                        </p:tgtEl>
+                                        <p:attrNameLst>
+                                          <p:attrName>style.visibility</p:attrName>
+                                        </p:attrNameLst>
+                                      </p:cBhvr>
+                                      <p:to>
+                                        <p:strVal val="visible"/>
+                                      </p:to>
+                                    </p:set>
+                                  </p:childTnLst>
+                                </p:cTn>
+                              </p:par>
+                            </p:childTnLst>
+                          </p:cTn>
+                        </p:par>
+                      </p:childTnLst>
+                    </p:cTn>
+                  </p:par>
+                  <p:par>
+                    <p:cTn id="11" fill="hold">
+                      <p:stCondLst>
+                        <p:cond delay="indefinite"/>
+                      </p:stCondLst>
+                      <p:childTnLst>
+                        <p:par>
+                          <p:cTn id="12" fill="hold">
+                            <p:stCondLst>
+                              <p:cond delay="0"/>
+                            </p:stCondLst>
+                            <p:childTnLst>
+                              <p:par>
+                                <p:cTn id="13" presetID="1" presetClass="entr" presetSubtype="0" fill="hold" grpId="0" nodeType="clickEffect">
+                                  <p:stCondLst>
+                                    <p:cond delay="0"/>
+                                  </p:stCondLst>
+                                  <p:childTnLst>
+                                    <p:set>
+                                      <p:cBhvr>
+                                        <p:cTn id="14" dur="1" fill="hold">
+                                          <p:stCondLst>
+                                            <p:cond delay="0"/>
+                                          </p:stCondLst>
+                                        </p:cTn>
+                                        <p:tgtEl>
+                                          <p:spTgt spid="10"/>
+                                        </p:tgtEl>
+                                        <p:attrNameLst>
+                                          <p:attrName>style.visibility</p:attrName>
+                                        </p:attrNameLst>
+                                      </p:cBhvr>
+                                      <p:to>
+                                        <p:strVal val="visible"/>
+                                      </p:to>
+                                    </p:set>
+                                  </p:childTnLst>
+                                </p:cTn>
+                              </p:par>
+                            </p:childTnLst>
+                          </p:cTn>
+                        </p:par>
+                      </p:childTnLst>
+                    </p:cTn>
+                  </p:par>
+                  <p:par>
+                    <p:cTn id="15" fill="hold">
+                      <p:stCondLst>
+                        <p:cond delay="indefinite"/>
+                      </p:stCondLst>
+                      <p:childTnLst>
+                        <p:par>
+                          <p:cTn id="16" fill="hold">
+                            <p:stCondLst>
+                              <p:cond delay="0"/>
+                            </p:stCondLst>
+                            <p:childTnLst>
+                              <p:par>
+                                <p:cTn id="17" presetID="1" presetClass="entr" presetSubtype="0" fill="hold" grpId="0" nodeType="clickEffect">
+                                  <p:stCondLst>
+                                    <p:cond delay="0"/>
+                                  </p:stCondLst>
+                                  <p:childTnLst>
+                                    <p:set>
+                                      <p:cBhvr>
+                                        <p:cTn id="18" dur="1" fill="hold">
+                                          <p:stCondLst>
+                                            <p:cond delay="0"/>
+                                          </p:stCondLst>
+                                        </p:cTn>
+                                        <p:tgtEl>
+                                          <p:spTgt spid="12"/>
+                                        </p:tgtEl>
+                                        <p:attrNameLst>
+                                          <p:attrName>style.visibility</p:attrName>
+                                        </p:attrNameLst>
+                                      </p:cBhvr>
+                                      <p:to>
+                                        <p:strVal val="visible"/>
+                                      </p:to>
+                                    </p:set>
+                                  </p:childTnLst>
+                                </p:cTn>
+                              </p:par>
+                            </p:childTnLst>
+                          </p:cTn>
+                        </p:par>
+                      </p:childTnLst>
+                    </p:cTn>
+                  </p:par>
+                </p:childTnLst>
+              </p:cTn>
+              <p:prevCondLst>
+                <p:cond evt="onPrev" delay="0">
+                  <p:tgtEl>
+                    <p:sldTgt/>
+                  </p:tgtEl>
+                </p:cond>
+              </p:prevCondLst>
+              <p:nextCondLst>
+                <p:cond evt="onNext" delay="0">
+                  <p:tgtEl>
+                    <p:sldTgt/>
+                  </p:tgtEl>
+                </p:cond>
+              </p:nextCondLst>
+            </p:seq>
+          </p:childTnLst>
+        </p:cTn>
+      </p:par>
+    </p:tnLst>
+    <p:bldLst>
+      <p:bldP spid="8" grpId="0"/>
+      <p:bldP spid="9" grpId="0"/>
+      <p:bldP spid="10" grpId="0"/>
+      <p:bldP spid="12" grpId="0"/>
+    </p:bldLst>
+  </p:timing>
+</p:sld>
+</file>
+
+<file path=ppt/slides/slide18.xml><?xml version="1.0" encoding="utf-8"?>
+<p:sld xmlns:a="http://schemas.openxmlformats.org/drawingml/2006/main" xmlns:r="http://schemas.openxmlformats.org/officeDocument/2006/relationships" xmlns:p="http://schemas.openxmlformats.org/presentationml/2006/main">
+  <p:cSld>
+    <p:spTree>
+      <p:nvGrpSpPr>
+        <p:cNvPr id="1" name=""/>
+        <p:cNvGrpSpPr/>
+        <p:nvPr/>
+      </p:nvGrpSpPr>
+      <p:grpSpPr>
+        <a:xfrm>
+          <a:off x="0" y="0"/>
+          <a:ext cx="0" cy="0"/>
+          <a:chOff x="0" y="0"/>
+          <a:chExt cx="0" cy="0"/>
+        </a:xfrm>
+      </p:grpSpPr>
+      <p:sp>
+        <p:nvSpPr>
+          <p:cNvPr id="2" name="Заголовок 1"/>
+          <p:cNvSpPr>
+            <a:spLocks noGrp="1"/>
+          </p:cNvSpPr>
+          <p:nvPr>
+            <p:ph type="title"/>
+          </p:nvPr>
+        </p:nvSpPr>
+        <p:spPr/>
+        <p:txBody>
+          <a:bodyPr/>
+          <a:lstStyle/>
+          <a:p>
+            <a:r>
+              <a:rPr lang="en-US" dirty="0"/>
+              <a:t>C# </a:t>
+            </a:r>
+            <a:r>
+              <a:rPr lang="en-US" dirty="0" smtClean="0"/>
+              <a:t>basics</a:t>
+            </a:r>
+            <a:br>
+              <a:rPr lang="en-US" dirty="0" smtClean="0"/>
+            </a:br>
+            <a:r>
+              <a:rPr lang="en-US" sz="2400" dirty="0" smtClean="0">
+                <a:solidFill>
+                  <a:prstClr val="white">
+                    <a:lumMod val="50000"/>
+                  </a:prstClr>
+                </a:solidFill>
+              </a:rPr>
+              <a:t>Useful links</a:t>
+            </a:r>
+            <a:endParaRPr lang="en-US" dirty="0"/>
+          </a:p>
+        </p:txBody>
+      </p:sp>
+      <p:sp>
+        <p:nvSpPr>
+          <p:cNvPr id="4" name="Дата 3"/>
+          <p:cNvSpPr>
+            <a:spLocks noGrp="1"/>
+          </p:cNvSpPr>
+          <p:nvPr>
+            <p:ph type="dt" sz="half" idx="10"/>
+          </p:nvPr>
+        </p:nvSpPr>
+        <p:spPr>
+          <a:xfrm>
+            <a:off x="6598153" y="6041362"/>
+            <a:ext cx="1518920" cy="365125"/>
+          </a:xfrm>
+        </p:spPr>
+        <p:txBody>
+          <a:bodyPr/>
+          <a:lstStyle/>
+          <a:p>
+            <a:fld id="{939306D3-16AC-481B-963B-74A1D01AC013}" type="datetime3">
+              <a:rPr lang="en-US" sz="1100" smtClean="0"/>
+              <a:t>30 September 2021</a:t>
+            </a:fld>
+            <a:endParaRPr lang="en-US" sz="1100" dirty="0"/>
+          </a:p>
+        </p:txBody>
+      </p:sp>
+      <p:sp>
+        <p:nvSpPr>
+          <p:cNvPr id="5" name="Нижний колонтитул 4"/>
+          <p:cNvSpPr>
+            <a:spLocks noGrp="1"/>
+          </p:cNvSpPr>
+          <p:nvPr>
+            <p:ph type="ftr" sz="quarter" idx="11"/>
+          </p:nvPr>
+        </p:nvSpPr>
+        <p:spPr/>
+        <p:txBody>
+          <a:bodyPr/>
+          <a:lstStyle/>
+          <a:p>
+            <a:r>
+              <a:rPr lang="en-US" sz="1100" dirty="0" smtClean="0"/>
+              <a:t>Automated framework with C#</a:t>
+            </a:r>
+          </a:p>
+          <a:p>
+            <a:r>
+              <a:rPr lang="en-US" sz="1100" dirty="0"/>
+              <a:t>Yury </a:t>
+            </a:r>
+            <a:r>
+              <a:rPr lang="en-US" sz="1100" dirty="0" smtClean="0"/>
+              <a:t>Alifanov</a:t>
+            </a:r>
+            <a:endParaRPr lang="en-US" sz="1100" dirty="0"/>
+          </a:p>
+        </p:txBody>
+      </p:sp>
+      <p:sp>
+        <p:nvSpPr>
+          <p:cNvPr id="6" name="Номер слайда 5"/>
+          <p:cNvSpPr>
+            <a:spLocks noGrp="1"/>
+          </p:cNvSpPr>
+          <p:nvPr>
+            <p:ph type="sldNum" sz="quarter" idx="12"/>
+          </p:nvPr>
+        </p:nvSpPr>
+        <p:spPr/>
+        <p:txBody>
+          <a:bodyPr/>
+          <a:lstStyle/>
+          <a:p>
+            <a:fld id="{519954A3-9DFD-4C44-94BA-B95130A3BA1C}" type="slidenum">
+              <a:rPr lang="en-US" sz="1100" smtClean="0"/>
+              <a:t>18</a:t>
+            </a:fld>
+            <a:endParaRPr lang="en-US" sz="1100" dirty="0"/>
+          </a:p>
+        </p:txBody>
+      </p:sp>
+      <p:sp>
+        <p:nvSpPr>
+          <p:cNvPr id="7" name="TextBox 6"/>
+          <p:cNvSpPr txBox="1"/>
+          <p:nvPr/>
+        </p:nvSpPr>
+        <p:spPr>
+          <a:xfrm>
+            <a:off x="711107" y="2596469"/>
+            <a:ext cx="7879556" cy="2185214"/>
+          </a:xfrm>
+          <a:prstGeom prst="rect">
+            <a:avLst/>
+          </a:prstGeom>
+          <a:noFill/>
+        </p:spPr>
+        <p:txBody>
+          <a:bodyPr wrap="square" rtlCol="0">
+            <a:spAutoFit/>
+          </a:bodyPr>
+          <a:lstStyle/>
+          <a:p>
+            <a:r>
+              <a:rPr lang="en-US" dirty="0" err="1" smtClean="0">
+                <a:latin typeface="Consolas" panose="020B0609020204030204" pitchFamily="49" charset="0"/>
+              </a:rPr>
+              <a:t>Svetlin</a:t>
+            </a:r>
+            <a:r>
+              <a:rPr lang="en-US" dirty="0" smtClean="0">
+                <a:latin typeface="Consolas" panose="020B0609020204030204" pitchFamily="49" charset="0"/>
+              </a:rPr>
+              <a:t> </a:t>
+            </a:r>
+            <a:r>
+              <a:rPr lang="en-US" dirty="0" err="1" smtClean="0">
+                <a:latin typeface="Consolas" panose="020B0609020204030204" pitchFamily="49" charset="0"/>
+              </a:rPr>
+              <a:t>Nakov</a:t>
+            </a:r>
+            <a:r>
+              <a:rPr lang="en-US" dirty="0" smtClean="0">
+                <a:latin typeface="Consolas" panose="020B0609020204030204" pitchFamily="49" charset="0"/>
+              </a:rPr>
+              <a:t> and Team</a:t>
+            </a:r>
+          </a:p>
+          <a:p>
+            <a:r>
+              <a:rPr lang="en-US" dirty="0" smtClean="0">
+                <a:latin typeface="Consolas" panose="020B0609020204030204" pitchFamily="49" charset="0"/>
+              </a:rPr>
+              <a:t>“Fundamentals of Computer Programming with C#”</a:t>
+            </a:r>
+          </a:p>
+          <a:p>
+            <a:endParaRPr lang="en-US" dirty="0">
+              <a:solidFill>
+                <a:srgbClr val="33CCCC"/>
+              </a:solidFill>
+              <a:latin typeface="Consolas" panose="020B0609020204030204" pitchFamily="49" charset="0"/>
+            </a:endParaRPr>
+          </a:p>
+          <a:p>
+            <a:r>
+              <a:rPr lang="en-US" dirty="0">
+                <a:solidFill>
+                  <a:srgbClr val="33CCCC"/>
+                </a:solidFill>
+                <a:latin typeface="Consolas" panose="020B0609020204030204" pitchFamily="49" charset="0"/>
+                <a:hlinkClick r:id="rId3"/>
+              </a:rPr>
+              <a:t>https://</a:t>
+            </a:r>
+            <a:r>
+              <a:rPr lang="en-US" dirty="0" smtClean="0">
+                <a:solidFill>
+                  <a:srgbClr val="33CCCC"/>
+                </a:solidFill>
+                <a:latin typeface="Consolas" panose="020B0609020204030204" pitchFamily="49" charset="0"/>
+                <a:hlinkClick r:id="rId3"/>
+              </a:rPr>
+              <a:t>introprogramming.info/english-intro-csharp-book</a:t>
+            </a:r>
+            <a:endParaRPr lang="en-US" dirty="0" smtClean="0">
+              <a:solidFill>
+                <a:srgbClr val="33CCCC"/>
+              </a:solidFill>
+              <a:latin typeface="Consolas" panose="020B0609020204030204" pitchFamily="49" charset="0"/>
+            </a:endParaRPr>
+          </a:p>
+          <a:p>
+            <a:endParaRPr lang="en-US" sz="1600" dirty="0" smtClean="0">
+              <a:solidFill>
+                <a:srgbClr val="33CCCC"/>
+              </a:solidFill>
+              <a:latin typeface="Consolas" panose="020B0609020204030204" pitchFamily="49" charset="0"/>
+            </a:endParaRPr>
+          </a:p>
+          <a:p>
+            <a:r>
+              <a:rPr lang="en-US" sz="1600" dirty="0" err="1" smtClean="0">
+                <a:latin typeface="Consolas" panose="020B0609020204030204" pitchFamily="49" charset="0"/>
+              </a:rPr>
+              <a:t>Metanit</a:t>
+            </a:r>
+            <a:r>
+              <a:rPr lang="en-US" sz="1600" dirty="0" smtClean="0">
+                <a:latin typeface="Consolas" panose="020B0609020204030204" pitchFamily="49" charset="0"/>
+              </a:rPr>
+              <a:t> site</a:t>
+            </a:r>
+          </a:p>
+          <a:p>
+            <a:endParaRPr lang="en-US" sz="1600" dirty="0" smtClean="0">
+              <a:latin typeface="Consolas" panose="020B0609020204030204" pitchFamily="49" charset="0"/>
+            </a:endParaRPr>
+          </a:p>
+          <a:p>
+            <a:r>
+              <a:rPr lang="en-US" sz="1600" dirty="0" smtClean="0">
+                <a:latin typeface="Consolas" panose="020B0609020204030204" pitchFamily="49" charset="0"/>
+                <a:hlinkClick r:id="rId4"/>
+              </a:rPr>
+              <a:t>https://metanit.com/sharp/tutorial/</a:t>
+            </a:r>
+            <a:endParaRPr lang="en-US" sz="1600" dirty="0" smtClean="0">
+              <a:latin typeface="Consolas" panose="020B0609020204030204" pitchFamily="49" charset="0"/>
+            </a:endParaRPr>
+          </a:p>
+        </p:txBody>
+      </p:sp>
+    </p:spTree>
+    <p:extLst>
+      <p:ext uri="{BB962C8B-B14F-4D97-AF65-F5344CB8AC3E}">
+        <p14:creationId xmlns:p14="http://schemas.microsoft.com/office/powerpoint/2010/main" val="3126519434"/>
+      </p:ext>
+    </p:extLst>
+  </p:cSld>
+  <p:clrMapOvr>
+    <a:masterClrMapping/>
+  </p:clrMapOvr>
+  <p:timing>
+    <p:tnLst>
+      <p:par>
+        <p:cTn id="1" dur="indefinite" restart="never" nodeType="tmRoot"/>
+      </p:par>
+    </p:tnLst>
+  </p:timing>
+</p:sld>
+</file>
+
+<file path=ppt/slides/slide19.xml><?xml version="1.0" encoding="utf-8"?>
+<p:sld xmlns:a="http://schemas.openxmlformats.org/drawingml/2006/main" xmlns:r="http://schemas.openxmlformats.org/officeDocument/2006/relationships" xmlns:p="http://schemas.openxmlformats.org/presentationml/2006/main">
+  <p:cSld>
+    <p:spTree>
+      <p:nvGrpSpPr>
+        <p:cNvPr id="1" name=""/>
+        <p:cNvGrpSpPr/>
+        <p:nvPr/>
+      </p:nvGrpSpPr>
+      <p:grpSpPr>
+        <a:xfrm>
+          <a:off x="0" y="0"/>
+          <a:ext cx="0" cy="0"/>
+          <a:chOff x="0" y="0"/>
+          <a:chExt cx="0" cy="0"/>
+        </a:xfrm>
+      </p:grpSpPr>
+      <p:sp>
+        <p:nvSpPr>
+          <p:cNvPr id="4" name="Дата 3"/>
+          <p:cNvSpPr>
+            <a:spLocks noGrp="1"/>
+          </p:cNvSpPr>
+          <p:nvPr>
+            <p:ph type="dt" sz="half" idx="10"/>
+          </p:nvPr>
+        </p:nvSpPr>
+        <p:spPr>
+          <a:xfrm>
+            <a:off x="6518189" y="6041362"/>
+            <a:ext cx="1598883" cy="365125"/>
+          </a:xfrm>
+        </p:spPr>
+        <p:txBody>
+          <a:bodyPr/>
+          <a:lstStyle/>
+          <a:p>
+            <a:fld id="{E3705B4D-1726-4BAB-A90E-07379DAEAD37}" type="datetime3">
+              <a:rPr lang="en-US" sz="1100" smtClean="0"/>
+              <a:t>30 September 2021</a:t>
+            </a:fld>
+            <a:endParaRPr lang="en-US" sz="1100" dirty="0"/>
+          </a:p>
+        </p:txBody>
+      </p:sp>
+      <p:sp>
+        <p:nvSpPr>
+          <p:cNvPr id="5" name="Нижний колонтитул 4"/>
+          <p:cNvSpPr>
+            <a:spLocks noGrp="1"/>
+          </p:cNvSpPr>
+          <p:nvPr>
+            <p:ph type="ftr" sz="quarter" idx="11"/>
+          </p:nvPr>
+        </p:nvSpPr>
+        <p:spPr/>
+        <p:txBody>
+          <a:bodyPr/>
+          <a:lstStyle/>
+          <a:p>
+            <a:r>
+              <a:rPr lang="en-US" sz="1100" dirty="0" smtClean="0"/>
+              <a:t>Automated framework with C#</a:t>
+            </a:r>
+          </a:p>
+          <a:p>
+            <a:r>
+              <a:rPr lang="en-US" sz="1100" dirty="0"/>
+              <a:t>Yury </a:t>
+            </a:r>
+            <a:r>
+              <a:rPr lang="en-US" sz="1100" dirty="0" smtClean="0"/>
+              <a:t>Alifanov</a:t>
+            </a:r>
+            <a:endParaRPr lang="en-US" sz="1100" dirty="0"/>
+          </a:p>
+        </p:txBody>
+      </p:sp>
+      <p:sp>
+        <p:nvSpPr>
+          <p:cNvPr id="6" name="Номер слайда 5"/>
+          <p:cNvSpPr>
+            <a:spLocks noGrp="1"/>
+          </p:cNvSpPr>
+          <p:nvPr>
+            <p:ph type="sldNum" sz="quarter" idx="12"/>
+          </p:nvPr>
+        </p:nvSpPr>
+        <p:spPr/>
+        <p:txBody>
+          <a:bodyPr/>
+          <a:lstStyle/>
+          <a:p>
+            <a:fld id="{519954A3-9DFD-4C44-94BA-B95130A3BA1C}" type="slidenum">
+              <a:rPr lang="en-US" sz="1100" smtClean="0"/>
+              <a:t>19</a:t>
             </a:fld>
             <a:endParaRPr lang="en-US" sz="1100" dirty="0"/>
           </a:p>
@@ -12384,7 +15598,7 @@
           <a:p>
             <a:fld id="{E3705B4D-1726-4BAB-A90E-07379DAEAD37}" type="datetime3">
               <a:rPr lang="en-US" sz="1100" smtClean="0"/>
-              <a:t>27 September 2021</a:t>
+              <a:t>30 September 2021</a:t>
             </a:fld>
             <a:endParaRPr lang="en-US" sz="1100" dirty="0"/>
           </a:p>
@@ -12836,7 +16050,7 @@
           <a:p>
             <a:fld id="{3792B3D8-82DF-4A6C-AFC1-06AFC1ABA742}" type="datetime3">
               <a:rPr lang="en-US" sz="1100" smtClean="0"/>
-              <a:t>27 September 2021</a:t>
+              <a:t>30 September 2021</a:t>
             </a:fld>
             <a:endParaRPr lang="en-US" sz="1100" dirty="0"/>
           </a:p>
@@ -13784,7 +16998,7 @@
           <a:p>
             <a:fld id="{E3705B4D-1726-4BAB-A90E-07379DAEAD37}" type="datetime3">
               <a:rPr lang="en-US" sz="1100" smtClean="0"/>
-              <a:t>27 September 2021</a:t>
+              <a:t>30 September 2021</a:t>
             </a:fld>
             <a:endParaRPr lang="en-US" sz="1100" dirty="0"/>
           </a:p>
@@ -14197,7 +17411,7 @@
           <a:p>
             <a:fld id="{171B5815-5139-4A68-A9FA-D26193D11F2D}" type="datetime3">
               <a:rPr lang="en-US" sz="1100" smtClean="0"/>
-              <a:t>27 September 2021</a:t>
+              <a:t>30 September 2021</a:t>
             </a:fld>
             <a:endParaRPr lang="en-US" sz="1100" dirty="0"/>
           </a:p>
@@ -15570,7 +18784,7 @@
           <a:p>
             <a:fld id="{E3705B4D-1726-4BAB-A90E-07379DAEAD37}" type="datetime3">
               <a:rPr lang="en-US" sz="1100" smtClean="0"/>
-              <a:t>27 September 2021</a:t>
+              <a:t>30 September 2021</a:t>
             </a:fld>
             <a:endParaRPr lang="en-US" sz="1100" dirty="0"/>
           </a:p>
@@ -15992,7 +19206,7 @@
           <a:p>
             <a:fld id="{E3705B4D-1726-4BAB-A90E-07379DAEAD37}" type="datetime3">
               <a:rPr lang="en-US" sz="1100" smtClean="0"/>
-              <a:t>27 September 2021</a:t>
+              <a:t>30 September 2021</a:t>
             </a:fld>
             <a:endParaRPr lang="en-US" sz="1100" dirty="0"/>
           </a:p>
@@ -17413,7 +20627,7 @@
           <a:p>
             <a:fld id="{146212BB-D587-45E4-8C80-89DA935C1E81}" type="datetime3">
               <a:rPr lang="en-US" sz="1100" smtClean="0"/>
-              <a:t>27 September 2021</a:t>
+              <a:t>30 September 2021</a:t>
             </a:fld>
             <a:endParaRPr lang="en-US" sz="1100" dirty="0"/>
           </a:p>
@@ -17881,15 +21095,7 @@
             </a:r>
             <a:r>
               <a:rPr lang="en-US" dirty="0" smtClean="0"/>
-              <a:t> </a:t>
-            </a:r>
-            <a:r>
-              <a:rPr lang="en-US" dirty="0" smtClean="0"/>
-              <a:t>push origin (+)HEAD </a:t>
-            </a:r>
-            <a:r>
-              <a:rPr lang="en-US" dirty="0" smtClean="0"/>
-              <a:t>– Push all local commits to remote repository</a:t>
+              <a:t> push – Push all local commits to remote repository</a:t>
             </a:r>
           </a:p>
           <a:p>
@@ -18239,7 +21445,7 @@
           <a:p>
             <a:fld id="{63E2318F-0C04-4A9D-B71F-4760BF0D8622}" type="datetime3">
               <a:rPr lang="en-US" sz="1100" smtClean="0"/>
-              <a:t>27 September 2021</a:t>
+              <a:t>30 September 2021</a:t>
             </a:fld>
             <a:endParaRPr lang="en-US" sz="1100" dirty="0"/>
           </a:p>

</xml_diff>